<commit_message>
Final decks before trim
</commit_message>
<xml_diff>
--- a/Slides/06 - Integrating Extra Features and Looking Forward.pptx
+++ b/Slides/06 - Integrating Extra Features and Looking Forward.pptx
@@ -5,10 +5,10 @@
     <p:sldMasterId id="2147483660" r:id="rId4"/>
   </p:sldMasterIdLst>
   <p:notesMasterIdLst>
-    <p:notesMasterId r:id="rId15"/>
+    <p:notesMasterId r:id="rId28"/>
   </p:notesMasterIdLst>
   <p:handoutMasterIdLst>
-    <p:handoutMasterId r:id="rId16"/>
+    <p:handoutMasterId r:id="rId29"/>
   </p:handoutMasterIdLst>
   <p:sldIdLst>
     <p:sldId id="336" r:id="rId5"/>
@@ -18,9 +18,22 @@
     <p:sldId id="343" r:id="rId9"/>
     <p:sldId id="384" r:id="rId10"/>
     <p:sldId id="331" r:id="rId11"/>
-    <p:sldId id="360" r:id="rId12"/>
-    <p:sldId id="347" r:id="rId13"/>
-    <p:sldId id="269" r:id="rId14"/>
+    <p:sldId id="392" r:id="rId12"/>
+    <p:sldId id="393" r:id="rId13"/>
+    <p:sldId id="398" r:id="rId14"/>
+    <p:sldId id="391" r:id="rId15"/>
+    <p:sldId id="394" r:id="rId16"/>
+    <p:sldId id="388" r:id="rId17"/>
+    <p:sldId id="385" r:id="rId18"/>
+    <p:sldId id="387" r:id="rId19"/>
+    <p:sldId id="389" r:id="rId20"/>
+    <p:sldId id="386" r:id="rId21"/>
+    <p:sldId id="397" r:id="rId22"/>
+    <p:sldId id="395" r:id="rId23"/>
+    <p:sldId id="396" r:id="rId24"/>
+    <p:sldId id="390" r:id="rId25"/>
+    <p:sldId id="347" r:id="rId26"/>
+    <p:sldId id="269" r:id="rId27"/>
   </p:sldIdLst>
   <p:sldSz cx="12192000" cy="6858000"/>
   <p:notesSz cx="6858000" cy="9144000"/>
@@ -212,7 +225,7 @@
           <a:p>
             <a:fld id="{312E7B4A-039C-48A2-9B2C-AF16AA3873D8}" type="datetimeFigureOut">
               <a:rPr lang="en-US" smtClean="0"/>
-              <a:t>1/25/2015</a:t>
+              <a:t>1/26/2015</a:t>
             </a:fld>
             <a:endParaRPr lang="en-US" dirty="0"/>
           </a:p>
@@ -377,7 +390,7 @@
           <a:p>
             <a:fld id="{DA005A0C-54D9-45AA-87D4-C551D08DFCE1}" type="datetimeFigureOut">
               <a:rPr lang="en-US" smtClean="0"/>
-              <a:t>1/25/2015</a:t>
+              <a:t>1/26/2015</a:t>
             </a:fld>
             <a:endParaRPr lang="en-US" dirty="0"/>
           </a:p>
@@ -735,6 +748,944 @@
 </p:notes>
 </file>
 
+<file path=ppt/notesSlides/notesSlide10.xml><?xml version="1.0" encoding="utf-8"?>
+<p:notes xmlns:a="http://schemas.openxmlformats.org/drawingml/2006/main" xmlns:r="http://schemas.openxmlformats.org/officeDocument/2006/relationships" xmlns:p="http://schemas.openxmlformats.org/presentationml/2006/main">
+  <p:cSld>
+    <p:spTree>
+      <p:nvGrpSpPr>
+        <p:cNvPr id="1" name=""/>
+        <p:cNvGrpSpPr/>
+        <p:nvPr/>
+      </p:nvGrpSpPr>
+      <p:grpSpPr>
+        <a:xfrm>
+          <a:off x="0" y="0"/>
+          <a:ext cx="0" cy="0"/>
+          <a:chOff x="0" y="0"/>
+          <a:chExt cx="0" cy="0"/>
+        </a:xfrm>
+      </p:grpSpPr>
+      <p:sp>
+        <p:nvSpPr>
+          <p:cNvPr id="2" name="Slide Image Placeholder 1"/>
+          <p:cNvSpPr>
+            <a:spLocks noGrp="1" noRot="1" noChangeAspect="1"/>
+          </p:cNvSpPr>
+          <p:nvPr>
+            <p:ph type="sldImg"/>
+          </p:nvPr>
+        </p:nvSpPr>
+        <p:spPr/>
+      </p:sp>
+      <p:sp>
+        <p:nvSpPr>
+          <p:cNvPr id="3" name="Notes Placeholder 2"/>
+          <p:cNvSpPr>
+            <a:spLocks noGrp="1"/>
+          </p:cNvSpPr>
+          <p:nvPr>
+            <p:ph type="body" idx="1"/>
+          </p:nvPr>
+        </p:nvSpPr>
+        <p:spPr/>
+        <p:txBody>
+          <a:bodyPr/>
+          <a:lstStyle/>
+          <a:p>
+            <a:endParaRPr lang="en-US" dirty="0"/>
+          </a:p>
+        </p:txBody>
+      </p:sp>
+      <p:sp>
+        <p:nvSpPr>
+          <p:cNvPr id="4" name="Slide Number Placeholder 3"/>
+          <p:cNvSpPr>
+            <a:spLocks noGrp="1"/>
+          </p:cNvSpPr>
+          <p:nvPr>
+            <p:ph type="sldNum" sz="quarter" idx="10"/>
+          </p:nvPr>
+        </p:nvSpPr>
+        <p:spPr/>
+        <p:txBody>
+          <a:bodyPr/>
+          <a:lstStyle/>
+          <a:p>
+            <a:fld id="{4CFD207A-07DF-40AD-A916-9872E089CE7A}" type="slidenum">
+              <a:rPr lang="en-US" smtClean="0"/>
+              <a:t>12</a:t>
+            </a:fld>
+            <a:endParaRPr lang="en-US" dirty="0"/>
+          </a:p>
+        </p:txBody>
+      </p:sp>
+    </p:spTree>
+    <p:extLst>
+      <p:ext uri="{BB962C8B-B14F-4D97-AF65-F5344CB8AC3E}">
+        <p14:creationId xmlns:p14="http://schemas.microsoft.com/office/powerpoint/2010/main" val="2392727767"/>
+      </p:ext>
+    </p:extLst>
+  </p:cSld>
+  <p:clrMapOvr>
+    <a:masterClrMapping/>
+  </p:clrMapOvr>
+</p:notes>
+</file>
+
+<file path=ppt/notesSlides/notesSlide11.xml><?xml version="1.0" encoding="utf-8"?>
+<p:notes xmlns:a="http://schemas.openxmlformats.org/drawingml/2006/main" xmlns:r="http://schemas.openxmlformats.org/officeDocument/2006/relationships" xmlns:p="http://schemas.openxmlformats.org/presentationml/2006/main">
+  <p:cSld>
+    <p:spTree>
+      <p:nvGrpSpPr>
+        <p:cNvPr id="1" name=""/>
+        <p:cNvGrpSpPr/>
+        <p:nvPr/>
+      </p:nvGrpSpPr>
+      <p:grpSpPr>
+        <a:xfrm>
+          <a:off x="0" y="0"/>
+          <a:ext cx="0" cy="0"/>
+          <a:chOff x="0" y="0"/>
+          <a:chExt cx="0" cy="0"/>
+        </a:xfrm>
+      </p:grpSpPr>
+      <p:sp>
+        <p:nvSpPr>
+          <p:cNvPr id="2" name="Slide Image Placeholder 1"/>
+          <p:cNvSpPr>
+            <a:spLocks noGrp="1" noRot="1" noChangeAspect="1"/>
+          </p:cNvSpPr>
+          <p:nvPr>
+            <p:ph type="sldImg"/>
+          </p:nvPr>
+        </p:nvSpPr>
+        <p:spPr/>
+      </p:sp>
+      <p:sp>
+        <p:nvSpPr>
+          <p:cNvPr id="3" name="Notes Placeholder 2"/>
+          <p:cNvSpPr>
+            <a:spLocks noGrp="1"/>
+          </p:cNvSpPr>
+          <p:nvPr>
+            <p:ph type="body" idx="1"/>
+          </p:nvPr>
+        </p:nvSpPr>
+        <p:spPr/>
+        <p:txBody>
+          <a:bodyPr/>
+          <a:lstStyle/>
+          <a:p>
+            <a:endParaRPr lang="en-US" dirty="0"/>
+          </a:p>
+        </p:txBody>
+      </p:sp>
+      <p:sp>
+        <p:nvSpPr>
+          <p:cNvPr id="4" name="Slide Number Placeholder 3"/>
+          <p:cNvSpPr>
+            <a:spLocks noGrp="1"/>
+          </p:cNvSpPr>
+          <p:nvPr>
+            <p:ph type="sldNum" sz="quarter" idx="10"/>
+          </p:nvPr>
+        </p:nvSpPr>
+        <p:spPr/>
+        <p:txBody>
+          <a:bodyPr/>
+          <a:lstStyle/>
+          <a:p>
+            <a:fld id="{4CFD207A-07DF-40AD-A916-9872E089CE7A}" type="slidenum">
+              <a:rPr lang="en-US" smtClean="0"/>
+              <a:t>14</a:t>
+            </a:fld>
+            <a:endParaRPr lang="en-US" dirty="0"/>
+          </a:p>
+        </p:txBody>
+      </p:sp>
+    </p:spTree>
+    <p:extLst>
+      <p:ext uri="{BB962C8B-B14F-4D97-AF65-F5344CB8AC3E}">
+        <p14:creationId xmlns:p14="http://schemas.microsoft.com/office/powerpoint/2010/main" val="4145088037"/>
+      </p:ext>
+    </p:extLst>
+  </p:cSld>
+  <p:clrMapOvr>
+    <a:masterClrMapping/>
+  </p:clrMapOvr>
+</p:notes>
+</file>
+
+<file path=ppt/notesSlides/notesSlide12.xml><?xml version="1.0" encoding="utf-8"?>
+<p:notes xmlns:a="http://schemas.openxmlformats.org/drawingml/2006/main" xmlns:r="http://schemas.openxmlformats.org/officeDocument/2006/relationships" xmlns:p="http://schemas.openxmlformats.org/presentationml/2006/main">
+  <p:cSld>
+    <p:spTree>
+      <p:nvGrpSpPr>
+        <p:cNvPr id="1" name=""/>
+        <p:cNvGrpSpPr/>
+        <p:nvPr/>
+      </p:nvGrpSpPr>
+      <p:grpSpPr>
+        <a:xfrm>
+          <a:off x="0" y="0"/>
+          <a:ext cx="0" cy="0"/>
+          <a:chOff x="0" y="0"/>
+          <a:chExt cx="0" cy="0"/>
+        </a:xfrm>
+      </p:grpSpPr>
+      <p:sp>
+        <p:nvSpPr>
+          <p:cNvPr id="2" name="Slide Image Placeholder 1"/>
+          <p:cNvSpPr>
+            <a:spLocks noGrp="1" noRot="1" noChangeAspect="1"/>
+          </p:cNvSpPr>
+          <p:nvPr>
+            <p:ph type="sldImg"/>
+          </p:nvPr>
+        </p:nvSpPr>
+        <p:spPr/>
+      </p:sp>
+      <p:sp>
+        <p:nvSpPr>
+          <p:cNvPr id="3" name="Notes Placeholder 2"/>
+          <p:cNvSpPr>
+            <a:spLocks noGrp="1"/>
+          </p:cNvSpPr>
+          <p:nvPr>
+            <p:ph type="body" idx="1"/>
+          </p:nvPr>
+        </p:nvSpPr>
+        <p:spPr/>
+        <p:txBody>
+          <a:bodyPr/>
+          <a:lstStyle/>
+          <a:p>
+            <a:r>
+              <a:rPr lang="en-US" dirty="0" err="1" smtClean="0"/>
+              <a:t>ToListAsync</a:t>
+            </a:r>
+            <a:endParaRPr lang="en-US" dirty="0" smtClean="0"/>
+          </a:p>
+          <a:p>
+            <a:r>
+              <a:rPr lang="en-US" dirty="0" smtClean="0"/>
+              <a:t>await </a:t>
+            </a:r>
+            <a:r>
+              <a:rPr lang="en-US" dirty="0" err="1" smtClean="0"/>
+              <a:t>db.SaveChangesAsync</a:t>
+            </a:r>
+            <a:endParaRPr lang="en-US" dirty="0" smtClean="0"/>
+          </a:p>
+          <a:p>
+            <a:r>
+              <a:rPr lang="en-US" dirty="0" smtClean="0"/>
+              <a:t> public </a:t>
+            </a:r>
+            <a:r>
+              <a:rPr lang="en-US" dirty="0" err="1" smtClean="0"/>
+              <a:t>async</a:t>
+            </a:r>
+            <a:r>
+              <a:rPr lang="en-US" dirty="0" smtClean="0"/>
+              <a:t> Task&lt;</a:t>
+            </a:r>
+            <a:r>
+              <a:rPr lang="en-US" dirty="0" err="1" smtClean="0"/>
+              <a:t>ActionResult</a:t>
+            </a:r>
+            <a:r>
+              <a:rPr lang="en-US" dirty="0" smtClean="0"/>
+              <a:t>&gt; </a:t>
+            </a:r>
+          </a:p>
+          <a:p>
+            <a:r>
+              <a:rPr lang="en-US" dirty="0" smtClean="0"/>
+              <a:t>Return task</a:t>
+            </a:r>
+          </a:p>
+          <a:p>
+            <a:endParaRPr lang="en-US" dirty="0" smtClean="0"/>
+          </a:p>
+          <a:p>
+            <a:endParaRPr lang="en-US" dirty="0" smtClean="0"/>
+          </a:p>
+          <a:p>
+            <a:r>
+              <a:rPr lang="en-US" sz="1200" kern="1200" dirty="0" smtClean="0">
+                <a:solidFill>
+                  <a:schemeClr val="tx1"/>
+                </a:solidFill>
+                <a:latin typeface="+mn-lt"/>
+                <a:ea typeface="+mn-ea"/>
+                <a:cs typeface="+mn-cs"/>
+              </a:rPr>
+              <a:t> [</a:t>
+            </a:r>
+            <a:r>
+              <a:rPr lang="en-US" sz="1200" kern="1200" dirty="0" err="1" smtClean="0">
+                <a:solidFill>
+                  <a:schemeClr val="tx1"/>
+                </a:solidFill>
+                <a:latin typeface="+mn-lt"/>
+                <a:ea typeface="+mn-ea"/>
+                <a:cs typeface="+mn-cs"/>
+              </a:rPr>
+              <a:t>HttpPost</a:t>
+            </a:r>
+            <a:r>
+              <a:rPr lang="en-US" sz="1200" kern="1200" dirty="0" smtClean="0">
+                <a:solidFill>
+                  <a:schemeClr val="tx1"/>
+                </a:solidFill>
+                <a:latin typeface="+mn-lt"/>
+                <a:ea typeface="+mn-ea"/>
+                <a:cs typeface="+mn-cs"/>
+              </a:rPr>
+              <a:t>]</a:t>
+            </a:r>
+          </a:p>
+          <a:p>
+            <a:r>
+              <a:rPr lang="en-US" sz="1200" kern="1200" dirty="0" smtClean="0">
+                <a:solidFill>
+                  <a:schemeClr val="tx1"/>
+                </a:solidFill>
+                <a:latin typeface="+mn-lt"/>
+                <a:ea typeface="+mn-ea"/>
+                <a:cs typeface="+mn-cs"/>
+              </a:rPr>
+              <a:t>        [</a:t>
+            </a:r>
+            <a:r>
+              <a:rPr lang="en-US" sz="1200" kern="1200" dirty="0" err="1" smtClean="0">
+                <a:solidFill>
+                  <a:schemeClr val="tx1"/>
+                </a:solidFill>
+                <a:latin typeface="+mn-lt"/>
+                <a:ea typeface="+mn-ea"/>
+                <a:cs typeface="+mn-cs"/>
+              </a:rPr>
+              <a:t>ValidateAntiForgeryToken</a:t>
+            </a:r>
+            <a:r>
+              <a:rPr lang="en-US" sz="1200" kern="1200" dirty="0" smtClean="0">
+                <a:solidFill>
+                  <a:schemeClr val="tx1"/>
+                </a:solidFill>
+                <a:latin typeface="+mn-lt"/>
+                <a:ea typeface="+mn-ea"/>
+                <a:cs typeface="+mn-cs"/>
+              </a:rPr>
+              <a:t>]</a:t>
+            </a:r>
+          </a:p>
+          <a:p>
+            <a:r>
+              <a:rPr lang="en-US" sz="1200" kern="1200" dirty="0" smtClean="0">
+                <a:solidFill>
+                  <a:schemeClr val="tx1"/>
+                </a:solidFill>
+                <a:latin typeface="+mn-lt"/>
+                <a:ea typeface="+mn-ea"/>
+                <a:cs typeface="+mn-cs"/>
+              </a:rPr>
+              <a:t>        public </a:t>
+            </a:r>
+            <a:r>
+              <a:rPr lang="en-US" sz="1200" kern="1200" dirty="0" err="1" smtClean="0">
+                <a:solidFill>
+                  <a:schemeClr val="tx1"/>
+                </a:solidFill>
+                <a:latin typeface="+mn-lt"/>
+                <a:ea typeface="+mn-ea"/>
+                <a:cs typeface="+mn-cs"/>
+              </a:rPr>
+              <a:t>async</a:t>
+            </a:r>
+            <a:r>
+              <a:rPr lang="en-US" sz="1200" kern="1200" dirty="0" smtClean="0">
+                <a:solidFill>
+                  <a:schemeClr val="tx1"/>
+                </a:solidFill>
+                <a:latin typeface="+mn-lt"/>
+                <a:ea typeface="+mn-ea"/>
+                <a:cs typeface="+mn-cs"/>
+              </a:rPr>
+              <a:t> Task&lt;</a:t>
+            </a:r>
+            <a:r>
+              <a:rPr lang="en-US" sz="1200" kern="1200" dirty="0" err="1" smtClean="0">
+                <a:solidFill>
+                  <a:schemeClr val="tx1"/>
+                </a:solidFill>
+                <a:latin typeface="+mn-lt"/>
+                <a:ea typeface="+mn-ea"/>
+                <a:cs typeface="+mn-cs"/>
+              </a:rPr>
+              <a:t>ActionResult</a:t>
+            </a:r>
+            <a:r>
+              <a:rPr lang="en-US" sz="1200" kern="1200" dirty="0" smtClean="0">
+                <a:solidFill>
+                  <a:schemeClr val="tx1"/>
+                </a:solidFill>
+                <a:latin typeface="+mn-lt"/>
+                <a:ea typeface="+mn-ea"/>
+                <a:cs typeface="+mn-cs"/>
+              </a:rPr>
+              <a:t>&gt; Create([Bind(Include = "</a:t>
+            </a:r>
+            <a:r>
+              <a:rPr lang="en-US" sz="1200" kern="1200" dirty="0" err="1" smtClean="0">
+                <a:solidFill>
+                  <a:schemeClr val="tx1"/>
+                </a:solidFill>
+                <a:latin typeface="+mn-lt"/>
+                <a:ea typeface="+mn-ea"/>
+                <a:cs typeface="+mn-cs"/>
+              </a:rPr>
+              <a:t>AlbumId,GenreId,ArtistId,Title,Price,AlbumArtUrl</a:t>
+            </a:r>
+            <a:r>
+              <a:rPr lang="en-US" sz="1200" kern="1200" dirty="0" smtClean="0">
+                <a:solidFill>
+                  <a:schemeClr val="tx1"/>
+                </a:solidFill>
+                <a:latin typeface="+mn-lt"/>
+                <a:ea typeface="+mn-ea"/>
+                <a:cs typeface="+mn-cs"/>
+              </a:rPr>
+              <a:t>")] Album album)</a:t>
+            </a:r>
+          </a:p>
+          <a:p>
+            <a:r>
+              <a:rPr lang="en-US" sz="1200" kern="1200" dirty="0" smtClean="0">
+                <a:solidFill>
+                  <a:schemeClr val="tx1"/>
+                </a:solidFill>
+                <a:latin typeface="+mn-lt"/>
+                <a:ea typeface="+mn-ea"/>
+                <a:cs typeface="+mn-cs"/>
+              </a:rPr>
+              <a:t>        {</a:t>
+            </a:r>
+          </a:p>
+          <a:p>
+            <a:r>
+              <a:rPr lang="en-US" sz="1200" kern="1200" dirty="0" smtClean="0">
+                <a:solidFill>
+                  <a:schemeClr val="tx1"/>
+                </a:solidFill>
+                <a:latin typeface="+mn-lt"/>
+                <a:ea typeface="+mn-ea"/>
+                <a:cs typeface="+mn-cs"/>
+              </a:rPr>
+              <a:t>            if (</a:t>
+            </a:r>
+            <a:r>
+              <a:rPr lang="en-US" sz="1200" kern="1200" dirty="0" err="1" smtClean="0">
+                <a:solidFill>
+                  <a:schemeClr val="tx1"/>
+                </a:solidFill>
+                <a:latin typeface="+mn-lt"/>
+                <a:ea typeface="+mn-ea"/>
+                <a:cs typeface="+mn-cs"/>
+              </a:rPr>
+              <a:t>ModelState.IsValid</a:t>
+            </a:r>
+            <a:r>
+              <a:rPr lang="en-US" sz="1200" kern="1200" dirty="0" smtClean="0">
+                <a:solidFill>
+                  <a:schemeClr val="tx1"/>
+                </a:solidFill>
+                <a:latin typeface="+mn-lt"/>
+                <a:ea typeface="+mn-ea"/>
+                <a:cs typeface="+mn-cs"/>
+              </a:rPr>
+              <a:t>)</a:t>
+            </a:r>
+          </a:p>
+          <a:p>
+            <a:r>
+              <a:rPr lang="en-US" sz="1200" kern="1200" dirty="0" smtClean="0">
+                <a:solidFill>
+                  <a:schemeClr val="tx1"/>
+                </a:solidFill>
+                <a:latin typeface="+mn-lt"/>
+                <a:ea typeface="+mn-ea"/>
+                <a:cs typeface="+mn-cs"/>
+              </a:rPr>
+              <a:t>            {</a:t>
+            </a:r>
+          </a:p>
+          <a:p>
+            <a:r>
+              <a:rPr lang="en-US" sz="1200" kern="1200" dirty="0" smtClean="0">
+                <a:solidFill>
+                  <a:schemeClr val="tx1"/>
+                </a:solidFill>
+                <a:latin typeface="+mn-lt"/>
+                <a:ea typeface="+mn-ea"/>
+                <a:cs typeface="+mn-cs"/>
+              </a:rPr>
+              <a:t>                </a:t>
+            </a:r>
+            <a:r>
+              <a:rPr lang="en-US" sz="1200" kern="1200" dirty="0" err="1" smtClean="0">
+                <a:solidFill>
+                  <a:schemeClr val="tx1"/>
+                </a:solidFill>
+                <a:latin typeface="+mn-lt"/>
+                <a:ea typeface="+mn-ea"/>
+                <a:cs typeface="+mn-cs"/>
+              </a:rPr>
+              <a:t>db.Albums.Add</a:t>
+            </a:r>
+            <a:r>
+              <a:rPr lang="en-US" sz="1200" kern="1200" dirty="0" smtClean="0">
+                <a:solidFill>
+                  <a:schemeClr val="tx1"/>
+                </a:solidFill>
+                <a:latin typeface="+mn-lt"/>
+                <a:ea typeface="+mn-ea"/>
+                <a:cs typeface="+mn-cs"/>
+              </a:rPr>
+              <a:t>(album);</a:t>
+            </a:r>
+          </a:p>
+          <a:p>
+            <a:r>
+              <a:rPr lang="en-US" sz="1200" kern="1200" dirty="0" smtClean="0">
+                <a:solidFill>
+                  <a:schemeClr val="tx1"/>
+                </a:solidFill>
+                <a:latin typeface="+mn-lt"/>
+                <a:ea typeface="+mn-ea"/>
+                <a:cs typeface="+mn-cs"/>
+              </a:rPr>
+              <a:t>                await </a:t>
+            </a:r>
+            <a:r>
+              <a:rPr lang="en-US" sz="1200" kern="1200" dirty="0" err="1" smtClean="0">
+                <a:solidFill>
+                  <a:schemeClr val="tx1"/>
+                </a:solidFill>
+                <a:latin typeface="+mn-lt"/>
+                <a:ea typeface="+mn-ea"/>
+                <a:cs typeface="+mn-cs"/>
+              </a:rPr>
+              <a:t>db.SaveChangesAsync</a:t>
+            </a:r>
+            <a:r>
+              <a:rPr lang="en-US" sz="1200" kern="1200" dirty="0" smtClean="0">
+                <a:solidFill>
+                  <a:schemeClr val="tx1"/>
+                </a:solidFill>
+                <a:latin typeface="+mn-lt"/>
+                <a:ea typeface="+mn-ea"/>
+                <a:cs typeface="+mn-cs"/>
+              </a:rPr>
+              <a:t>();</a:t>
+            </a:r>
+          </a:p>
+          <a:p>
+            <a:r>
+              <a:rPr lang="en-US" sz="1200" kern="1200" dirty="0" smtClean="0">
+                <a:solidFill>
+                  <a:schemeClr val="tx1"/>
+                </a:solidFill>
+                <a:latin typeface="+mn-lt"/>
+                <a:ea typeface="+mn-ea"/>
+                <a:cs typeface="+mn-cs"/>
+              </a:rPr>
+              <a:t>                return </a:t>
+            </a:r>
+            <a:r>
+              <a:rPr lang="en-US" sz="1200" kern="1200" dirty="0" err="1" smtClean="0">
+                <a:solidFill>
+                  <a:schemeClr val="tx1"/>
+                </a:solidFill>
+                <a:latin typeface="+mn-lt"/>
+                <a:ea typeface="+mn-ea"/>
+                <a:cs typeface="+mn-cs"/>
+              </a:rPr>
+              <a:t>RedirectToAction</a:t>
+            </a:r>
+            <a:r>
+              <a:rPr lang="en-US" sz="1200" kern="1200" dirty="0" smtClean="0">
+                <a:solidFill>
+                  <a:schemeClr val="tx1"/>
+                </a:solidFill>
+                <a:latin typeface="+mn-lt"/>
+                <a:ea typeface="+mn-ea"/>
+                <a:cs typeface="+mn-cs"/>
+              </a:rPr>
+              <a:t>("Index");</a:t>
+            </a:r>
+          </a:p>
+          <a:p>
+            <a:r>
+              <a:rPr lang="en-US" sz="1200" kern="1200" dirty="0" smtClean="0">
+                <a:solidFill>
+                  <a:schemeClr val="tx1"/>
+                </a:solidFill>
+                <a:latin typeface="+mn-lt"/>
+                <a:ea typeface="+mn-ea"/>
+                <a:cs typeface="+mn-cs"/>
+              </a:rPr>
+              <a:t>            }</a:t>
+            </a:r>
+          </a:p>
+          <a:p>
+            <a:endParaRPr lang="en-US" sz="1200" kern="1200" dirty="0" smtClean="0">
+              <a:solidFill>
+                <a:schemeClr val="tx1"/>
+              </a:solidFill>
+              <a:latin typeface="+mn-lt"/>
+              <a:ea typeface="+mn-ea"/>
+              <a:cs typeface="+mn-cs"/>
+            </a:endParaRPr>
+          </a:p>
+          <a:p>
+            <a:r>
+              <a:rPr lang="en-US" sz="1200" kern="1200" dirty="0" smtClean="0">
+                <a:solidFill>
+                  <a:schemeClr val="tx1"/>
+                </a:solidFill>
+                <a:latin typeface="+mn-lt"/>
+                <a:ea typeface="+mn-ea"/>
+                <a:cs typeface="+mn-cs"/>
+              </a:rPr>
+              <a:t>            return View(album);</a:t>
+            </a:r>
+          </a:p>
+          <a:p>
+            <a:r>
+              <a:rPr lang="en-US" sz="1200" kern="1200" dirty="0" smtClean="0">
+                <a:solidFill>
+                  <a:schemeClr val="tx1"/>
+                </a:solidFill>
+                <a:latin typeface="+mn-lt"/>
+                <a:ea typeface="+mn-ea"/>
+                <a:cs typeface="+mn-cs"/>
+              </a:rPr>
+              <a:t>        }</a:t>
+            </a:r>
+          </a:p>
+          <a:p>
+            <a:endParaRPr lang="en-US" dirty="0" smtClean="0"/>
+          </a:p>
+          <a:p>
+            <a:endParaRPr lang="en-US" dirty="0"/>
+          </a:p>
+        </p:txBody>
+      </p:sp>
+      <p:sp>
+        <p:nvSpPr>
+          <p:cNvPr id="4" name="Slide Number Placeholder 3"/>
+          <p:cNvSpPr>
+            <a:spLocks noGrp="1"/>
+          </p:cNvSpPr>
+          <p:nvPr>
+            <p:ph type="sldNum" sz="quarter" idx="10"/>
+          </p:nvPr>
+        </p:nvSpPr>
+        <p:spPr/>
+        <p:txBody>
+          <a:bodyPr/>
+          <a:lstStyle/>
+          <a:p>
+            <a:fld id="{4CFD207A-07DF-40AD-A916-9872E089CE7A}" type="slidenum">
+              <a:rPr lang="en-US" smtClean="0"/>
+              <a:t>16</a:t>
+            </a:fld>
+            <a:endParaRPr lang="en-US" dirty="0"/>
+          </a:p>
+        </p:txBody>
+      </p:sp>
+    </p:spTree>
+    <p:extLst>
+      <p:ext uri="{BB962C8B-B14F-4D97-AF65-F5344CB8AC3E}">
+        <p14:creationId xmlns:p14="http://schemas.microsoft.com/office/powerpoint/2010/main" val="3929865972"/>
+      </p:ext>
+    </p:extLst>
+  </p:cSld>
+  <p:clrMapOvr>
+    <a:masterClrMapping/>
+  </p:clrMapOvr>
+</p:notes>
+</file>
+
+<file path=ppt/notesSlides/notesSlide13.xml><?xml version="1.0" encoding="utf-8"?>
+<p:notes xmlns:a="http://schemas.openxmlformats.org/drawingml/2006/main" xmlns:r="http://schemas.openxmlformats.org/officeDocument/2006/relationships" xmlns:p="http://schemas.openxmlformats.org/presentationml/2006/main">
+  <p:cSld>
+    <p:spTree>
+      <p:nvGrpSpPr>
+        <p:cNvPr id="1" name=""/>
+        <p:cNvGrpSpPr/>
+        <p:nvPr/>
+      </p:nvGrpSpPr>
+      <p:grpSpPr>
+        <a:xfrm>
+          <a:off x="0" y="0"/>
+          <a:ext cx="0" cy="0"/>
+          <a:chOff x="0" y="0"/>
+          <a:chExt cx="0" cy="0"/>
+        </a:xfrm>
+      </p:grpSpPr>
+      <p:sp>
+        <p:nvSpPr>
+          <p:cNvPr id="2" name="Slide Image Placeholder 1"/>
+          <p:cNvSpPr>
+            <a:spLocks noGrp="1" noRot="1" noChangeAspect="1"/>
+          </p:cNvSpPr>
+          <p:nvPr>
+            <p:ph type="sldImg"/>
+          </p:nvPr>
+        </p:nvSpPr>
+        <p:spPr/>
+      </p:sp>
+      <p:sp>
+        <p:nvSpPr>
+          <p:cNvPr id="3" name="Notes Placeholder 2"/>
+          <p:cNvSpPr>
+            <a:spLocks noGrp="1"/>
+          </p:cNvSpPr>
+          <p:nvPr>
+            <p:ph type="body" idx="1"/>
+          </p:nvPr>
+        </p:nvSpPr>
+        <p:spPr/>
+        <p:txBody>
+          <a:bodyPr/>
+          <a:lstStyle/>
+          <a:p>
+            <a:r>
+              <a:rPr lang="en-US" dirty="0" smtClean="0"/>
+              <a:t>Change method to be </a:t>
+            </a:r>
+            <a:r>
+              <a:rPr lang="en-US" dirty="0" err="1" smtClean="0"/>
+              <a:t>async</a:t>
+            </a:r>
+            <a:r>
+              <a:rPr lang="en-US" baseline="0" dirty="0" smtClean="0"/>
+              <a:t> for save</a:t>
+            </a:r>
+            <a:endParaRPr lang="en-US" dirty="0" smtClean="0"/>
+          </a:p>
+          <a:p>
+            <a:endParaRPr lang="en-US" dirty="0"/>
+          </a:p>
+        </p:txBody>
+      </p:sp>
+      <p:sp>
+        <p:nvSpPr>
+          <p:cNvPr id="4" name="Slide Number Placeholder 3"/>
+          <p:cNvSpPr>
+            <a:spLocks noGrp="1"/>
+          </p:cNvSpPr>
+          <p:nvPr>
+            <p:ph type="sldNum" sz="quarter" idx="10"/>
+          </p:nvPr>
+        </p:nvSpPr>
+        <p:spPr/>
+        <p:txBody>
+          <a:bodyPr/>
+          <a:lstStyle/>
+          <a:p>
+            <a:fld id="{4CFD207A-07DF-40AD-A916-9872E089CE7A}" type="slidenum">
+              <a:rPr lang="en-US" smtClean="0"/>
+              <a:t>18</a:t>
+            </a:fld>
+            <a:endParaRPr lang="en-US" dirty="0"/>
+          </a:p>
+        </p:txBody>
+      </p:sp>
+    </p:spTree>
+    <p:extLst>
+      <p:ext uri="{BB962C8B-B14F-4D97-AF65-F5344CB8AC3E}">
+        <p14:creationId xmlns:p14="http://schemas.microsoft.com/office/powerpoint/2010/main" val="2949295217"/>
+      </p:ext>
+    </p:extLst>
+  </p:cSld>
+  <p:clrMapOvr>
+    <a:masterClrMapping/>
+  </p:clrMapOvr>
+</p:notes>
+</file>
+
+<file path=ppt/notesSlides/notesSlide14.xml><?xml version="1.0" encoding="utf-8"?>
+<p:notes xmlns:a="http://schemas.openxmlformats.org/drawingml/2006/main" xmlns:r="http://schemas.openxmlformats.org/officeDocument/2006/relationships" xmlns:p="http://schemas.openxmlformats.org/presentationml/2006/main">
+  <p:cSld>
+    <p:spTree>
+      <p:nvGrpSpPr>
+        <p:cNvPr id="1" name=""/>
+        <p:cNvGrpSpPr/>
+        <p:nvPr/>
+      </p:nvGrpSpPr>
+      <p:grpSpPr>
+        <a:xfrm>
+          <a:off x="0" y="0"/>
+          <a:ext cx="0" cy="0"/>
+          <a:chOff x="0" y="0"/>
+          <a:chExt cx="0" cy="0"/>
+        </a:xfrm>
+      </p:grpSpPr>
+      <p:sp>
+        <p:nvSpPr>
+          <p:cNvPr id="2" name="Slide Image Placeholder 1"/>
+          <p:cNvSpPr>
+            <a:spLocks noGrp="1" noRot="1" noChangeAspect="1"/>
+          </p:cNvSpPr>
+          <p:nvPr>
+            <p:ph type="sldImg"/>
+          </p:nvPr>
+        </p:nvSpPr>
+        <p:spPr/>
+      </p:sp>
+      <p:sp>
+        <p:nvSpPr>
+          <p:cNvPr id="3" name="Notes Placeholder 2"/>
+          <p:cNvSpPr>
+            <a:spLocks noGrp="1"/>
+          </p:cNvSpPr>
+          <p:nvPr>
+            <p:ph type="body" idx="1"/>
+          </p:nvPr>
+        </p:nvSpPr>
+        <p:spPr/>
+        <p:txBody>
+          <a:bodyPr/>
+          <a:lstStyle/>
+          <a:p>
+            <a:endParaRPr lang="en-US" dirty="0"/>
+          </a:p>
+        </p:txBody>
+      </p:sp>
+      <p:sp>
+        <p:nvSpPr>
+          <p:cNvPr id="4" name="Slide Number Placeholder 3"/>
+          <p:cNvSpPr>
+            <a:spLocks noGrp="1"/>
+          </p:cNvSpPr>
+          <p:nvPr>
+            <p:ph type="sldNum" sz="quarter" idx="10"/>
+          </p:nvPr>
+        </p:nvSpPr>
+        <p:spPr/>
+        <p:txBody>
+          <a:bodyPr/>
+          <a:lstStyle/>
+          <a:p>
+            <a:fld id="{4CFD207A-07DF-40AD-A916-9872E089CE7A}" type="slidenum">
+              <a:rPr lang="en-US" smtClean="0"/>
+              <a:t>19</a:t>
+            </a:fld>
+            <a:endParaRPr lang="en-US" dirty="0"/>
+          </a:p>
+        </p:txBody>
+      </p:sp>
+    </p:spTree>
+    <p:extLst>
+      <p:ext uri="{BB962C8B-B14F-4D97-AF65-F5344CB8AC3E}">
+        <p14:creationId xmlns:p14="http://schemas.microsoft.com/office/powerpoint/2010/main" val="1881028706"/>
+      </p:ext>
+    </p:extLst>
+  </p:cSld>
+  <p:clrMapOvr>
+    <a:masterClrMapping/>
+  </p:clrMapOvr>
+</p:notes>
+</file>
+
+<file path=ppt/notesSlides/notesSlide15.xml><?xml version="1.0" encoding="utf-8"?>
+<p:notes xmlns:a="http://schemas.openxmlformats.org/drawingml/2006/main" xmlns:r="http://schemas.openxmlformats.org/officeDocument/2006/relationships" xmlns:p="http://schemas.openxmlformats.org/presentationml/2006/main">
+  <p:cSld>
+    <p:spTree>
+      <p:nvGrpSpPr>
+        <p:cNvPr id="1" name=""/>
+        <p:cNvGrpSpPr/>
+        <p:nvPr/>
+      </p:nvGrpSpPr>
+      <p:grpSpPr>
+        <a:xfrm>
+          <a:off x="0" y="0"/>
+          <a:ext cx="0" cy="0"/>
+          <a:chOff x="0" y="0"/>
+          <a:chExt cx="0" cy="0"/>
+        </a:xfrm>
+      </p:grpSpPr>
+      <p:sp>
+        <p:nvSpPr>
+          <p:cNvPr id="2" name="Slide Image Placeholder 1"/>
+          <p:cNvSpPr>
+            <a:spLocks noGrp="1" noRot="1" noChangeAspect="1"/>
+          </p:cNvSpPr>
+          <p:nvPr>
+            <p:ph type="sldImg"/>
+          </p:nvPr>
+        </p:nvSpPr>
+        <p:spPr/>
+      </p:sp>
+      <p:sp>
+        <p:nvSpPr>
+          <p:cNvPr id="3" name="Notes Placeholder 2"/>
+          <p:cNvSpPr>
+            <a:spLocks noGrp="1"/>
+          </p:cNvSpPr>
+          <p:nvPr>
+            <p:ph type="body" idx="1"/>
+          </p:nvPr>
+        </p:nvSpPr>
+        <p:spPr/>
+        <p:txBody>
+          <a:bodyPr/>
+          <a:lstStyle/>
+          <a:p>
+            <a:endParaRPr lang="en-US" dirty="0"/>
+          </a:p>
+        </p:txBody>
+      </p:sp>
+      <p:sp>
+        <p:nvSpPr>
+          <p:cNvPr id="4" name="Slide Number Placeholder 3"/>
+          <p:cNvSpPr>
+            <a:spLocks noGrp="1"/>
+          </p:cNvSpPr>
+          <p:nvPr>
+            <p:ph type="sldNum" sz="quarter" idx="10"/>
+          </p:nvPr>
+        </p:nvSpPr>
+        <p:spPr/>
+        <p:txBody>
+          <a:bodyPr/>
+          <a:lstStyle/>
+          <a:p>
+            <a:fld id="{4CFD207A-07DF-40AD-A916-9872E089CE7A}" type="slidenum">
+              <a:rPr lang="en-US" smtClean="0"/>
+              <a:t>21</a:t>
+            </a:fld>
+            <a:endParaRPr lang="en-US" dirty="0"/>
+          </a:p>
+        </p:txBody>
+      </p:sp>
+    </p:spTree>
+    <p:extLst>
+      <p:ext uri="{BB962C8B-B14F-4D97-AF65-F5344CB8AC3E}">
+        <p14:creationId xmlns:p14="http://schemas.microsoft.com/office/powerpoint/2010/main" val="1118676913"/>
+      </p:ext>
+    </p:extLst>
+  </p:cSld>
+  <p:clrMapOvr>
+    <a:masterClrMapping/>
+  </p:clrMapOvr>
+</p:notes>
+</file>
+
 <file path=ppt/notesSlides/notesSlide2.xml><?xml version="1.0" encoding="utf-8"?>
 <p:notes xmlns:a="http://schemas.openxmlformats.org/drawingml/2006/main" xmlns:r="http://schemas.openxmlformats.org/officeDocument/2006/relationships" xmlns:p="http://schemas.openxmlformats.org/presentationml/2006/main">
   <p:cSld>
@@ -1469,7 +2420,175 @@
     </p:spTree>
     <p:extLst>
       <p:ext uri="{BB962C8B-B14F-4D97-AF65-F5344CB8AC3E}">
-        <p14:creationId xmlns:p14="http://schemas.microsoft.com/office/powerpoint/2010/main" val="3476266708"/>
+        <p14:creationId xmlns:p14="http://schemas.microsoft.com/office/powerpoint/2010/main" val="1877167305"/>
+      </p:ext>
+    </p:extLst>
+  </p:cSld>
+  <p:clrMapOvr>
+    <a:masterClrMapping/>
+  </p:clrMapOvr>
+</p:notes>
+</file>
+
+<file path=ppt/notesSlides/notesSlide8.xml><?xml version="1.0" encoding="utf-8"?>
+<p:notes xmlns:a="http://schemas.openxmlformats.org/drawingml/2006/main" xmlns:r="http://schemas.openxmlformats.org/officeDocument/2006/relationships" xmlns:p="http://schemas.openxmlformats.org/presentationml/2006/main">
+  <p:cSld>
+    <p:spTree>
+      <p:nvGrpSpPr>
+        <p:cNvPr id="1" name=""/>
+        <p:cNvGrpSpPr/>
+        <p:nvPr/>
+      </p:nvGrpSpPr>
+      <p:grpSpPr>
+        <a:xfrm>
+          <a:off x="0" y="0"/>
+          <a:ext cx="0" cy="0"/>
+          <a:chOff x="0" y="0"/>
+          <a:chExt cx="0" cy="0"/>
+        </a:xfrm>
+      </p:grpSpPr>
+      <p:sp>
+        <p:nvSpPr>
+          <p:cNvPr id="2" name="Slide Image Placeholder 1"/>
+          <p:cNvSpPr>
+            <a:spLocks noGrp="1" noRot="1" noChangeAspect="1"/>
+          </p:cNvSpPr>
+          <p:nvPr>
+            <p:ph type="sldImg"/>
+          </p:nvPr>
+        </p:nvSpPr>
+        <p:spPr/>
+      </p:sp>
+      <p:sp>
+        <p:nvSpPr>
+          <p:cNvPr id="3" name="Notes Placeholder 2"/>
+          <p:cNvSpPr>
+            <a:spLocks noGrp="1"/>
+          </p:cNvSpPr>
+          <p:nvPr>
+            <p:ph type="body" idx="1"/>
+          </p:nvPr>
+        </p:nvSpPr>
+        <p:spPr/>
+        <p:txBody>
+          <a:bodyPr/>
+          <a:lstStyle/>
+          <a:p>
+            <a:endParaRPr lang="en-US" dirty="0"/>
+          </a:p>
+        </p:txBody>
+      </p:sp>
+      <p:sp>
+        <p:nvSpPr>
+          <p:cNvPr id="4" name="Slide Number Placeholder 3"/>
+          <p:cNvSpPr>
+            <a:spLocks noGrp="1"/>
+          </p:cNvSpPr>
+          <p:nvPr>
+            <p:ph type="sldNum" sz="quarter" idx="10"/>
+          </p:nvPr>
+        </p:nvSpPr>
+        <p:spPr/>
+        <p:txBody>
+          <a:bodyPr/>
+          <a:lstStyle/>
+          <a:p>
+            <a:fld id="{4CFD207A-07DF-40AD-A916-9872E089CE7A}" type="slidenum">
+              <a:rPr lang="en-US" smtClean="0"/>
+              <a:t>9</a:t>
+            </a:fld>
+            <a:endParaRPr lang="en-US" dirty="0"/>
+          </a:p>
+        </p:txBody>
+      </p:sp>
+    </p:spTree>
+    <p:extLst>
+      <p:ext uri="{BB962C8B-B14F-4D97-AF65-F5344CB8AC3E}">
+        <p14:creationId xmlns:p14="http://schemas.microsoft.com/office/powerpoint/2010/main" val="939141578"/>
+      </p:ext>
+    </p:extLst>
+  </p:cSld>
+  <p:clrMapOvr>
+    <a:masterClrMapping/>
+  </p:clrMapOvr>
+</p:notes>
+</file>
+
+<file path=ppt/notesSlides/notesSlide9.xml><?xml version="1.0" encoding="utf-8"?>
+<p:notes xmlns:a="http://schemas.openxmlformats.org/drawingml/2006/main" xmlns:r="http://schemas.openxmlformats.org/officeDocument/2006/relationships" xmlns:p="http://schemas.openxmlformats.org/presentationml/2006/main">
+  <p:cSld>
+    <p:spTree>
+      <p:nvGrpSpPr>
+        <p:cNvPr id="1" name=""/>
+        <p:cNvGrpSpPr/>
+        <p:nvPr/>
+      </p:nvGrpSpPr>
+      <p:grpSpPr>
+        <a:xfrm>
+          <a:off x="0" y="0"/>
+          <a:ext cx="0" cy="0"/>
+          <a:chOff x="0" y="0"/>
+          <a:chExt cx="0" cy="0"/>
+        </a:xfrm>
+      </p:grpSpPr>
+      <p:sp>
+        <p:nvSpPr>
+          <p:cNvPr id="2" name="Slide Image Placeholder 1"/>
+          <p:cNvSpPr>
+            <a:spLocks noGrp="1" noRot="1" noChangeAspect="1"/>
+          </p:cNvSpPr>
+          <p:nvPr>
+            <p:ph type="sldImg"/>
+          </p:nvPr>
+        </p:nvSpPr>
+        <p:spPr/>
+      </p:sp>
+      <p:sp>
+        <p:nvSpPr>
+          <p:cNvPr id="3" name="Notes Placeholder 2"/>
+          <p:cNvSpPr>
+            <a:spLocks noGrp="1"/>
+          </p:cNvSpPr>
+          <p:nvPr>
+            <p:ph type="body" idx="1"/>
+          </p:nvPr>
+        </p:nvSpPr>
+        <p:spPr/>
+        <p:txBody>
+          <a:bodyPr/>
+          <a:lstStyle/>
+          <a:p>
+            <a:endParaRPr lang="en-US" dirty="0"/>
+          </a:p>
+        </p:txBody>
+      </p:sp>
+      <p:sp>
+        <p:nvSpPr>
+          <p:cNvPr id="4" name="Slide Number Placeholder 3"/>
+          <p:cNvSpPr>
+            <a:spLocks noGrp="1"/>
+          </p:cNvSpPr>
+          <p:nvPr>
+            <p:ph type="sldNum" sz="quarter" idx="10"/>
+          </p:nvPr>
+        </p:nvSpPr>
+        <p:spPr/>
+        <p:txBody>
+          <a:bodyPr/>
+          <a:lstStyle/>
+          <a:p>
+            <a:fld id="{4CFD207A-07DF-40AD-A916-9872E089CE7A}" type="slidenum">
+              <a:rPr lang="en-US" smtClean="0"/>
+              <a:t>11</a:t>
+            </a:fld>
+            <a:endParaRPr lang="en-US" dirty="0"/>
+          </a:p>
+        </p:txBody>
+      </p:sp>
+    </p:spTree>
+    <p:extLst>
+      <p:ext uri="{BB962C8B-B14F-4D97-AF65-F5344CB8AC3E}">
+        <p14:creationId xmlns:p14="http://schemas.microsoft.com/office/powerpoint/2010/main" val="1685181968"/>
       </p:ext>
     </p:extLst>
   </p:cSld>
@@ -4230,10 +5349,2209 @@
           <a:chExt cx="0" cy="0"/>
         </a:xfrm>
       </p:grpSpPr>
+      <p:sp>
+        <p:nvSpPr>
+          <p:cNvPr id="4" name="Title 3"/>
+          <p:cNvSpPr>
+            <a:spLocks noGrp="1"/>
+          </p:cNvSpPr>
+          <p:nvPr>
+            <p:ph type="title"/>
+          </p:nvPr>
+        </p:nvSpPr>
+        <p:spPr/>
+        <p:txBody>
+          <a:bodyPr/>
+          <a:lstStyle/>
+          <a:p>
+            <a:r>
+              <a:rPr lang="en-US" dirty="0" smtClean="0"/>
+              <a:t>Concurrency</a:t>
+            </a:r>
+            <a:endParaRPr lang="en-US" dirty="0"/>
+          </a:p>
+        </p:txBody>
+      </p:sp>
+      <p:sp>
+        <p:nvSpPr>
+          <p:cNvPr id="5" name="Content Placeholder 4"/>
+          <p:cNvSpPr>
+            <a:spLocks noGrp="1"/>
+          </p:cNvSpPr>
+          <p:nvPr>
+            <p:ph sz="quarter" idx="10"/>
+          </p:nvPr>
+        </p:nvSpPr>
+        <p:spPr>
+          <a:xfrm>
+            <a:off x="379412" y="1388226"/>
+            <a:ext cx="12143892" cy="5290388"/>
+          </a:xfrm>
+        </p:spPr>
+        <p:txBody>
+          <a:bodyPr/>
+          <a:lstStyle/>
+          <a:p>
+            <a:r>
+              <a:rPr lang="en-US" dirty="0" smtClean="0"/>
+              <a:t>As Chris showed, easy to implement via concurrency token</a:t>
+            </a:r>
+          </a:p>
+          <a:p>
+            <a:pPr lvl="1"/>
+            <a:r>
+              <a:rPr lang="en-US" dirty="0" smtClean="0"/>
+              <a:t>[</a:t>
+            </a:r>
+            <a:r>
+              <a:rPr lang="en-US" dirty="0" err="1" smtClean="0"/>
+              <a:t>TimeStamp</a:t>
+            </a:r>
+            <a:r>
+              <a:rPr lang="en-US" dirty="0" smtClean="0"/>
+              <a:t>]</a:t>
+            </a:r>
+          </a:p>
+          <a:p>
+            <a:pPr lvl="1"/>
+            <a:r>
+              <a:rPr lang="en-US" dirty="0" err="1" smtClean="0"/>
+              <a:t>modelBuilder.Entity</a:t>
+            </a:r>
+            <a:r>
+              <a:rPr lang="en-US" dirty="0" smtClean="0"/>
+              <a:t>&lt;</a:t>
+            </a:r>
+            <a:r>
+              <a:rPr lang="en-US" dirty="0" err="1" smtClean="0"/>
+              <a:t>YourEntity</a:t>
+            </a:r>
+            <a:r>
+              <a:rPr lang="en-US" dirty="0" smtClean="0"/>
+              <a:t>&gt;()</a:t>
+            </a:r>
+          </a:p>
+          <a:p>
+            <a:pPr marL="457046" lvl="1" indent="0">
+              <a:buNone/>
+            </a:pPr>
+            <a:r>
+              <a:rPr lang="en-US" dirty="0" smtClean="0"/>
+              <a:t>                                 .</a:t>
+            </a:r>
+            <a:r>
+              <a:rPr lang="en-US" dirty="0"/>
+              <a:t>Property(e =&gt; </a:t>
+            </a:r>
+            <a:r>
+              <a:rPr lang="en-US" dirty="0" err="1"/>
+              <a:t>e.Timestamp</a:t>
+            </a:r>
+            <a:r>
+              <a:rPr lang="en-US" dirty="0" smtClean="0"/>
+              <a:t>)</a:t>
+            </a:r>
+          </a:p>
+          <a:p>
+            <a:pPr marL="457046" lvl="1" indent="0">
+              <a:buNone/>
+            </a:pPr>
+            <a:r>
+              <a:rPr lang="en-US" dirty="0"/>
+              <a:t> </a:t>
+            </a:r>
+            <a:r>
+              <a:rPr lang="en-US" dirty="0" smtClean="0"/>
+              <a:t>                                .</a:t>
+            </a:r>
+            <a:r>
+              <a:rPr lang="en-US" dirty="0" err="1"/>
+              <a:t>IsRowVersion</a:t>
+            </a:r>
+            <a:r>
+              <a:rPr lang="en-US" dirty="0"/>
+              <a:t>(); </a:t>
+            </a:r>
+            <a:endParaRPr lang="en-US" dirty="0" smtClean="0"/>
+          </a:p>
+          <a:p>
+            <a:r>
+              <a:rPr lang="en-US" dirty="0" smtClean="0"/>
+              <a:t>Change detection can be enhanced via MVC Action Filters</a:t>
+            </a:r>
+          </a:p>
+          <a:p>
+            <a:r>
+              <a:rPr lang="en-US" dirty="0" smtClean="0"/>
+              <a:t>Let’s give the user the choice on how to proceed</a:t>
+            </a:r>
+            <a:endParaRPr lang="en-US" dirty="0"/>
+          </a:p>
+        </p:txBody>
+      </p:sp>
     </p:spTree>
     <p:extLst>
       <p:ext uri="{BB962C8B-B14F-4D97-AF65-F5344CB8AC3E}">
-        <p14:creationId xmlns:p14="http://schemas.microsoft.com/office/powerpoint/2010/main" val="898363405"/>
+        <p14:creationId xmlns:p14="http://schemas.microsoft.com/office/powerpoint/2010/main" val="1553145199"/>
+      </p:ext>
+    </p:extLst>
+  </p:cSld>
+  <p:clrMapOvr>
+    <a:masterClrMapping/>
+  </p:clrMapOvr>
+  <p:timing>
+    <p:tnLst>
+      <p:par>
+        <p:cTn id="1" dur="indefinite" restart="never" nodeType="tmRoot"/>
+      </p:par>
+    </p:tnLst>
+  </p:timing>
+</p:sld>
+</file>
+
+<file path=ppt/slides/slide11.xml><?xml version="1.0" encoding="utf-8"?>
+<p:sld xmlns:a="http://schemas.openxmlformats.org/drawingml/2006/main" xmlns:r="http://schemas.openxmlformats.org/officeDocument/2006/relationships" xmlns:p="http://schemas.openxmlformats.org/presentationml/2006/main">
+  <p:cSld>
+    <p:spTree>
+      <p:nvGrpSpPr>
+        <p:cNvPr id="1" name=""/>
+        <p:cNvGrpSpPr/>
+        <p:nvPr/>
+      </p:nvGrpSpPr>
+      <p:grpSpPr>
+        <a:xfrm>
+          <a:off x="0" y="0"/>
+          <a:ext cx="0" cy="0"/>
+          <a:chOff x="0" y="0"/>
+          <a:chExt cx="0" cy="0"/>
+        </a:xfrm>
+      </p:grpSpPr>
+      <p:sp>
+        <p:nvSpPr>
+          <p:cNvPr id="4" name="Title 3"/>
+          <p:cNvSpPr>
+            <a:spLocks noGrp="1"/>
+          </p:cNvSpPr>
+          <p:nvPr>
+            <p:ph type="title"/>
+          </p:nvPr>
+        </p:nvSpPr>
+        <p:spPr/>
+        <p:txBody>
+          <a:bodyPr/>
+          <a:lstStyle/>
+          <a:p>
+            <a:r>
+              <a:rPr lang="en-US" dirty="0" smtClean="0"/>
+              <a:t>Concurrency detection and user choice</a:t>
+            </a:r>
+            <a:endParaRPr lang="en-US" dirty="0"/>
+          </a:p>
+        </p:txBody>
+      </p:sp>
+    </p:spTree>
+    <p:extLst>
+      <p:ext uri="{BB962C8B-B14F-4D97-AF65-F5344CB8AC3E}">
+        <p14:creationId xmlns:p14="http://schemas.microsoft.com/office/powerpoint/2010/main" val="846209435"/>
+      </p:ext>
+    </p:extLst>
+  </p:cSld>
+  <p:clrMapOvr>
+    <a:masterClrMapping/>
+  </p:clrMapOvr>
+  <p:timing>
+    <p:tnLst>
+      <p:par>
+        <p:cTn id="1" dur="indefinite" restart="never" nodeType="tmRoot"/>
+      </p:par>
+    </p:tnLst>
+  </p:timing>
+</p:sld>
+</file>
+
+<file path=ppt/slides/slide12.xml><?xml version="1.0" encoding="utf-8"?>
+<p:sld xmlns:a="http://schemas.openxmlformats.org/drawingml/2006/main" xmlns:r="http://schemas.openxmlformats.org/officeDocument/2006/relationships" xmlns:p="http://schemas.openxmlformats.org/presentationml/2006/main">
+  <p:cSld>
+    <p:spTree>
+      <p:nvGrpSpPr>
+        <p:cNvPr id="1" name=""/>
+        <p:cNvGrpSpPr/>
+        <p:nvPr/>
+      </p:nvGrpSpPr>
+      <p:grpSpPr>
+        <a:xfrm>
+          <a:off x="0" y="0"/>
+          <a:ext cx="0" cy="0"/>
+          <a:chOff x="0" y="0"/>
+          <a:chExt cx="0" cy="0"/>
+        </a:xfrm>
+      </p:grpSpPr>
+      <p:sp>
+        <p:nvSpPr>
+          <p:cNvPr id="4" name="Text Placeholder 3"/>
+          <p:cNvSpPr>
+            <a:spLocks noGrp="1"/>
+          </p:cNvSpPr>
+          <p:nvPr>
+            <p:ph type="body" sz="quarter" idx="10"/>
+          </p:nvPr>
+        </p:nvSpPr>
+        <p:spPr/>
+        <p:txBody>
+          <a:bodyPr/>
+          <a:lstStyle/>
+          <a:p>
+            <a:r>
+              <a:rPr lang="en-GB" dirty="0" smtClean="0"/>
+              <a:t>A few best practices</a:t>
+            </a:r>
+            <a:endParaRPr lang="en-GB" dirty="0"/>
+          </a:p>
+        </p:txBody>
+      </p:sp>
+      <p:sp>
+        <p:nvSpPr>
+          <p:cNvPr id="3" name="Subtitle 2"/>
+          <p:cNvSpPr>
+            <a:spLocks noGrp="1"/>
+          </p:cNvSpPr>
+          <p:nvPr>
+            <p:ph type="subTitle" idx="1"/>
+          </p:nvPr>
+        </p:nvSpPr>
+        <p:spPr/>
+        <p:txBody>
+          <a:bodyPr/>
+          <a:lstStyle/>
+          <a:p>
+            <a:endParaRPr lang="en-US" dirty="0"/>
+          </a:p>
+        </p:txBody>
+      </p:sp>
+    </p:spTree>
+    <p:extLst>
+      <p:ext uri="{BB962C8B-B14F-4D97-AF65-F5344CB8AC3E}">
+        <p14:creationId xmlns:p14="http://schemas.microsoft.com/office/powerpoint/2010/main" val="1605520740"/>
+      </p:ext>
+    </p:extLst>
+  </p:cSld>
+  <p:clrMapOvr>
+    <a:masterClrMapping/>
+  </p:clrMapOvr>
+  <p:timing>
+    <p:tnLst>
+      <p:par>
+        <p:cTn id="1" dur="indefinite" restart="never" nodeType="tmRoot"/>
+      </p:par>
+    </p:tnLst>
+  </p:timing>
+</p:sld>
+</file>
+
+<file path=ppt/slides/slide13.xml><?xml version="1.0" encoding="utf-8"?>
+<p:sld xmlns:a="http://schemas.openxmlformats.org/drawingml/2006/main" xmlns:r="http://schemas.openxmlformats.org/officeDocument/2006/relationships" xmlns:p="http://schemas.openxmlformats.org/presentationml/2006/main">
+  <p:cSld>
+    <p:spTree>
+      <p:nvGrpSpPr>
+        <p:cNvPr id="1" name=""/>
+        <p:cNvGrpSpPr/>
+        <p:nvPr/>
+      </p:nvGrpSpPr>
+      <p:grpSpPr>
+        <a:xfrm>
+          <a:off x="0" y="0"/>
+          <a:ext cx="0" cy="0"/>
+          <a:chOff x="0" y="0"/>
+          <a:chExt cx="0" cy="0"/>
+        </a:xfrm>
+      </p:grpSpPr>
+      <p:sp>
+        <p:nvSpPr>
+          <p:cNvPr id="2" name="Title 1"/>
+          <p:cNvSpPr>
+            <a:spLocks noGrp="1"/>
+          </p:cNvSpPr>
+          <p:nvPr>
+            <p:ph type="title"/>
+          </p:nvPr>
+        </p:nvSpPr>
+        <p:spPr/>
+        <p:txBody>
+          <a:bodyPr/>
+          <a:lstStyle/>
+          <a:p>
+            <a:r>
+              <a:rPr lang="en-US" dirty="0" smtClean="0"/>
+              <a:t>Helpful hints in a web world</a:t>
+            </a:r>
+            <a:endParaRPr lang="en-US" dirty="0"/>
+          </a:p>
+        </p:txBody>
+      </p:sp>
+      <p:sp>
+        <p:nvSpPr>
+          <p:cNvPr id="3" name="Content Placeholder 2"/>
+          <p:cNvSpPr>
+            <a:spLocks noGrp="1"/>
+          </p:cNvSpPr>
+          <p:nvPr>
+            <p:ph sz="quarter" idx="10"/>
+          </p:nvPr>
+        </p:nvSpPr>
+        <p:spPr/>
+        <p:txBody>
+          <a:bodyPr/>
+          <a:lstStyle/>
+          <a:p>
+            <a:r>
+              <a:rPr lang="en-US" dirty="0" smtClean="0"/>
+              <a:t>Since </a:t>
+            </a:r>
+            <a:r>
+              <a:rPr lang="en-US" dirty="0" smtClean="0"/>
+              <a:t>the web layers (controller to view) are disconnected</a:t>
+            </a:r>
+          </a:p>
+          <a:p>
+            <a:pPr lvl="1"/>
+            <a:r>
+              <a:rPr lang="en-US" dirty="0" smtClean="0"/>
+              <a:t>Always convert </a:t>
+            </a:r>
+            <a:r>
+              <a:rPr lang="en-US" dirty="0"/>
+              <a:t>results </a:t>
+            </a:r>
+            <a:r>
+              <a:rPr lang="en-US" dirty="0" smtClean="0"/>
+              <a:t>to </a:t>
+            </a:r>
+            <a:r>
+              <a:rPr lang="en-US" dirty="0" err="1" smtClean="0"/>
+              <a:t>IEnumerable</a:t>
+            </a:r>
+            <a:r>
+              <a:rPr lang="en-US" dirty="0" smtClean="0"/>
+              <a:t> </a:t>
+            </a:r>
+            <a:r>
+              <a:rPr lang="en-US" dirty="0" smtClean="0"/>
+              <a:t>via .</a:t>
+            </a:r>
+            <a:r>
+              <a:rPr lang="en-US" dirty="0" err="1" smtClean="0"/>
+              <a:t>ToList</a:t>
+            </a:r>
+            <a:r>
+              <a:rPr lang="en-US" dirty="0" smtClean="0"/>
+              <a:t>()</a:t>
+            </a:r>
+          </a:p>
+          <a:p>
+            <a:pPr lvl="2"/>
+            <a:r>
+              <a:rPr lang="en-US" dirty="0" smtClean="0"/>
+              <a:t>Ex. </a:t>
+            </a:r>
+            <a:r>
+              <a:rPr lang="en-US" dirty="0" err="1"/>
+              <a:t>context.Albums.Where</a:t>
+            </a:r>
+            <a:r>
+              <a:rPr lang="en-US" dirty="0"/>
+              <a:t>(o=&gt;</a:t>
+            </a:r>
+            <a:r>
+              <a:rPr lang="en-US" dirty="0" err="1" smtClean="0"/>
+              <a:t>o.Title.Contains</a:t>
+            </a:r>
+            <a:r>
+              <a:rPr lang="en-US" dirty="0" smtClean="0"/>
+              <a:t>(search).</a:t>
+            </a:r>
+            <a:r>
+              <a:rPr lang="en-US" dirty="0" err="1"/>
+              <a:t>ToList</a:t>
+            </a:r>
+            <a:r>
+              <a:rPr lang="en-US" dirty="0" smtClean="0"/>
+              <a:t>()</a:t>
+            </a:r>
+          </a:p>
+          <a:p>
+            <a:r>
+              <a:rPr lang="en-GB" dirty="0"/>
+              <a:t>Disable lazy loading in web environments</a:t>
+            </a:r>
+          </a:p>
+          <a:p>
+            <a:pPr lvl="1"/>
+            <a:r>
+              <a:rPr lang="en-US" dirty="0" err="1"/>
+              <a:t>context.Configuration.LazyLoadingEnabled</a:t>
+            </a:r>
+            <a:r>
+              <a:rPr lang="en-US" dirty="0"/>
+              <a:t> = false;</a:t>
+            </a:r>
+          </a:p>
+          <a:p>
+            <a:pPr lvl="1"/>
+            <a:r>
+              <a:rPr lang="en-US" dirty="0"/>
+              <a:t>Use .Include to load related </a:t>
+            </a:r>
+            <a:r>
+              <a:rPr lang="en-US" dirty="0" smtClean="0"/>
+              <a:t>entities</a:t>
+            </a:r>
+          </a:p>
+          <a:p>
+            <a:r>
+              <a:rPr lang="en-US" dirty="0" err="1"/>
+              <a:t>DbContext</a:t>
+            </a:r>
+            <a:r>
+              <a:rPr lang="en-US" dirty="0"/>
+              <a:t> is not thread safe. Do not cache it!</a:t>
+            </a:r>
+          </a:p>
+          <a:p>
+            <a:pPr lvl="1"/>
+            <a:r>
+              <a:rPr lang="en-US" dirty="0"/>
+              <a:t>Always dispose </a:t>
+            </a:r>
+            <a:r>
+              <a:rPr lang="en-US" dirty="0" err="1"/>
+              <a:t>DbContext</a:t>
+            </a:r>
+            <a:r>
+              <a:rPr lang="en-US" dirty="0"/>
+              <a:t> when done</a:t>
+            </a:r>
+          </a:p>
+          <a:p>
+            <a:endParaRPr lang="en-GB" dirty="0"/>
+          </a:p>
+          <a:p>
+            <a:endParaRPr lang="en-US" dirty="0" smtClean="0"/>
+          </a:p>
+        </p:txBody>
+      </p:sp>
+    </p:spTree>
+    <p:extLst>
+      <p:ext uri="{BB962C8B-B14F-4D97-AF65-F5344CB8AC3E}">
+        <p14:creationId xmlns:p14="http://schemas.microsoft.com/office/powerpoint/2010/main" val="995889985"/>
+      </p:ext>
+    </p:extLst>
+  </p:cSld>
+  <p:clrMapOvr>
+    <a:masterClrMapping/>
+  </p:clrMapOvr>
+  <p:timing>
+    <p:tnLst>
+      <p:par>
+        <p:cTn id="1" dur="indefinite" restart="never" nodeType="tmRoot"/>
+      </p:par>
+    </p:tnLst>
+  </p:timing>
+</p:sld>
+</file>
+
+<file path=ppt/slides/slide14.xml><?xml version="1.0" encoding="utf-8"?>
+<p:sld xmlns:a="http://schemas.openxmlformats.org/drawingml/2006/main" xmlns:r="http://schemas.openxmlformats.org/officeDocument/2006/relationships" xmlns:p="http://schemas.openxmlformats.org/presentationml/2006/main">
+  <p:cSld>
+    <p:spTree>
+      <p:nvGrpSpPr>
+        <p:cNvPr id="1" name=""/>
+        <p:cNvGrpSpPr/>
+        <p:nvPr/>
+      </p:nvGrpSpPr>
+      <p:grpSpPr>
+        <a:xfrm>
+          <a:off x="0" y="0"/>
+          <a:ext cx="0" cy="0"/>
+          <a:chOff x="0" y="0"/>
+          <a:chExt cx="0" cy="0"/>
+        </a:xfrm>
+      </p:grpSpPr>
+      <p:sp>
+        <p:nvSpPr>
+          <p:cNvPr id="2" name="Title 1"/>
+          <p:cNvSpPr>
+            <a:spLocks noGrp="1"/>
+          </p:cNvSpPr>
+          <p:nvPr>
+            <p:ph type="title"/>
+          </p:nvPr>
+        </p:nvSpPr>
+        <p:spPr/>
+        <p:txBody>
+          <a:bodyPr/>
+          <a:lstStyle/>
+          <a:p>
+            <a:r>
+              <a:rPr lang="en-US" dirty="0" smtClean="0"/>
+              <a:t>Context lifetime</a:t>
+            </a:r>
+            <a:endParaRPr lang="en-US" dirty="0"/>
+          </a:p>
+        </p:txBody>
+      </p:sp>
+      <p:sp>
+        <p:nvSpPr>
+          <p:cNvPr id="3" name="Content Placeholder 2"/>
+          <p:cNvSpPr>
+            <a:spLocks noGrp="1"/>
+          </p:cNvSpPr>
+          <p:nvPr>
+            <p:ph sz="quarter" idx="10"/>
+          </p:nvPr>
+        </p:nvSpPr>
+        <p:spPr/>
+        <p:txBody>
+          <a:bodyPr/>
+          <a:lstStyle/>
+          <a:p>
+            <a:r>
+              <a:rPr lang="en-GB" dirty="0" smtClean="0"/>
+              <a:t>When context is gone, connection is gone</a:t>
+            </a:r>
+          </a:p>
+          <a:p>
+            <a:pPr lvl="1"/>
+            <a:r>
+              <a:rPr lang="en-GB" dirty="0" smtClean="0"/>
+              <a:t>Can’t (and shouldn’t) use connection from MVC view </a:t>
+            </a:r>
+          </a:p>
+          <a:p>
+            <a:pPr lvl="1"/>
+            <a:r>
+              <a:rPr lang="en-GB" dirty="0" smtClean="0"/>
+              <a:t>Get data, send to view</a:t>
+            </a:r>
+          </a:p>
+          <a:p>
+            <a:r>
+              <a:rPr lang="en-GB" dirty="0" smtClean="0"/>
+              <a:t>Always </a:t>
+            </a:r>
+            <a:r>
+              <a:rPr lang="en-GB" dirty="0"/>
+              <a:t>execute result set when needed before exiting using()</a:t>
+            </a:r>
+          </a:p>
+          <a:p>
+            <a:endParaRPr lang="en-US" dirty="0"/>
+          </a:p>
+        </p:txBody>
+      </p:sp>
+      <p:sp>
+        <p:nvSpPr>
+          <p:cNvPr id="4" name="TextBox 3"/>
+          <p:cNvSpPr txBox="1"/>
+          <p:nvPr/>
+        </p:nvSpPr>
+        <p:spPr>
+          <a:xfrm>
+            <a:off x="728868" y="3605174"/>
+            <a:ext cx="10084905" cy="2677656"/>
+          </a:xfrm>
+          <a:prstGeom prst="rect">
+            <a:avLst/>
+          </a:prstGeom>
+          <a:noFill/>
+        </p:spPr>
+        <p:txBody>
+          <a:bodyPr wrap="square" rtlCol="0">
+            <a:spAutoFit/>
+          </a:bodyPr>
+          <a:lstStyle/>
+          <a:p>
+            <a:r>
+              <a:rPr lang="en-US" sz="2400" dirty="0">
+                <a:solidFill>
+                  <a:srgbClr val="0000FF"/>
+                </a:solidFill>
+                <a:highlight>
+                  <a:srgbClr val="FFFFFF"/>
+                </a:highlight>
+                <a:latin typeface="Consolas" panose="020B0609020204030204" pitchFamily="49" charset="0"/>
+              </a:rPr>
+              <a:t>using</a:t>
+            </a:r>
+            <a:r>
+              <a:rPr lang="en-US" sz="2400" dirty="0">
+                <a:solidFill>
+                  <a:srgbClr val="000000"/>
+                </a:solidFill>
+                <a:highlight>
+                  <a:srgbClr val="FFFFFF"/>
+                </a:highlight>
+                <a:latin typeface="Consolas" panose="020B0609020204030204" pitchFamily="49" charset="0"/>
+              </a:rPr>
+              <a:t> (</a:t>
+            </a:r>
+            <a:r>
+              <a:rPr lang="en-US" sz="2400" dirty="0" err="1">
+                <a:solidFill>
+                  <a:srgbClr val="0000FF"/>
+                </a:solidFill>
+                <a:highlight>
+                  <a:srgbClr val="FFFFFF"/>
+                </a:highlight>
+                <a:latin typeface="Consolas" panose="020B0609020204030204" pitchFamily="49" charset="0"/>
+              </a:rPr>
+              <a:t>var</a:t>
+            </a:r>
+            <a:r>
+              <a:rPr lang="en-US" sz="2400" dirty="0">
+                <a:solidFill>
+                  <a:srgbClr val="000000"/>
+                </a:solidFill>
+                <a:highlight>
+                  <a:srgbClr val="FFFFFF"/>
+                </a:highlight>
+                <a:latin typeface="Consolas" panose="020B0609020204030204" pitchFamily="49" charset="0"/>
+              </a:rPr>
+              <a:t> context = </a:t>
+            </a:r>
+            <a:r>
+              <a:rPr lang="en-US" sz="2400" dirty="0">
+                <a:solidFill>
+                  <a:srgbClr val="0000FF"/>
+                </a:solidFill>
+                <a:highlight>
+                  <a:srgbClr val="FFFFFF"/>
+                </a:highlight>
+                <a:latin typeface="Consolas" panose="020B0609020204030204" pitchFamily="49" charset="0"/>
+              </a:rPr>
+              <a:t>new</a:t>
+            </a:r>
+            <a:r>
+              <a:rPr lang="en-US" sz="2400" dirty="0">
+                <a:solidFill>
+                  <a:srgbClr val="000000"/>
+                </a:solidFill>
+                <a:highlight>
+                  <a:srgbClr val="FFFFFF"/>
+                </a:highlight>
+                <a:latin typeface="Consolas" panose="020B0609020204030204" pitchFamily="49" charset="0"/>
+              </a:rPr>
+              <a:t> </a:t>
+            </a:r>
+            <a:r>
+              <a:rPr lang="en-US" sz="2400" dirty="0" err="1">
+                <a:solidFill>
+                  <a:srgbClr val="2B91AF"/>
+                </a:solidFill>
+                <a:highlight>
+                  <a:srgbClr val="FFFFFF"/>
+                </a:highlight>
+                <a:latin typeface="Consolas" panose="020B0609020204030204" pitchFamily="49" charset="0"/>
+              </a:rPr>
+              <a:t>MusicContext</a:t>
+            </a:r>
+            <a:r>
+              <a:rPr lang="en-US" sz="2400" dirty="0">
+                <a:solidFill>
+                  <a:srgbClr val="000000"/>
+                </a:solidFill>
+                <a:highlight>
+                  <a:srgbClr val="FFFFFF"/>
+                </a:highlight>
+                <a:latin typeface="Consolas" panose="020B0609020204030204" pitchFamily="49" charset="0"/>
+              </a:rPr>
+              <a:t>())</a:t>
+            </a:r>
+          </a:p>
+          <a:p>
+            <a:r>
+              <a:rPr lang="en-US" sz="2400" dirty="0">
+                <a:solidFill>
+                  <a:srgbClr val="000000"/>
+                </a:solidFill>
+                <a:highlight>
+                  <a:srgbClr val="FFFFFF"/>
+                </a:highlight>
+                <a:latin typeface="Consolas" panose="020B0609020204030204" pitchFamily="49" charset="0"/>
+              </a:rPr>
+              <a:t>{</a:t>
+            </a:r>
+          </a:p>
+          <a:p>
+            <a:r>
+              <a:rPr lang="en-US" sz="2400" dirty="0">
+                <a:solidFill>
+                  <a:srgbClr val="000000"/>
+                </a:solidFill>
+                <a:highlight>
+                  <a:srgbClr val="FFFFFF"/>
+                </a:highlight>
+                <a:latin typeface="Consolas" panose="020B0609020204030204" pitchFamily="49" charset="0"/>
+              </a:rPr>
+              <a:t>    </a:t>
+            </a:r>
+            <a:r>
+              <a:rPr lang="en-US" sz="2400" dirty="0" err="1">
+                <a:solidFill>
+                  <a:srgbClr val="0000FF"/>
+                </a:solidFill>
+                <a:highlight>
+                  <a:srgbClr val="FFFFFF"/>
+                </a:highlight>
+                <a:latin typeface="Consolas" panose="020B0609020204030204" pitchFamily="49" charset="0"/>
+              </a:rPr>
+              <a:t>var</a:t>
+            </a:r>
+            <a:r>
+              <a:rPr lang="en-US" sz="2400" dirty="0">
+                <a:solidFill>
+                  <a:srgbClr val="000000"/>
+                </a:solidFill>
+                <a:highlight>
+                  <a:srgbClr val="FFFFFF"/>
+                </a:highlight>
+                <a:latin typeface="Consolas" panose="020B0609020204030204" pitchFamily="49" charset="0"/>
+              </a:rPr>
+              <a:t> albums = </a:t>
+            </a:r>
+            <a:r>
+              <a:rPr lang="en-US" sz="2400" dirty="0" err="1">
+                <a:solidFill>
+                  <a:srgbClr val="000000"/>
+                </a:solidFill>
+                <a:highlight>
+                  <a:srgbClr val="FFFFFF"/>
+                </a:highlight>
+                <a:latin typeface="Consolas" panose="020B0609020204030204" pitchFamily="49" charset="0"/>
+              </a:rPr>
+              <a:t>context.Albums</a:t>
+            </a:r>
+            <a:endParaRPr lang="en-US" sz="2400" dirty="0">
+              <a:solidFill>
+                <a:srgbClr val="000000"/>
+              </a:solidFill>
+              <a:highlight>
+                <a:srgbClr val="FFFFFF"/>
+              </a:highlight>
+              <a:latin typeface="Consolas" panose="020B0609020204030204" pitchFamily="49" charset="0"/>
+            </a:endParaRPr>
+          </a:p>
+          <a:p>
+            <a:r>
+              <a:rPr lang="en-US" sz="2400" dirty="0">
+                <a:solidFill>
+                  <a:srgbClr val="000000"/>
+                </a:solidFill>
+                <a:highlight>
+                  <a:srgbClr val="FFFFFF"/>
+                </a:highlight>
+                <a:latin typeface="Consolas" panose="020B0609020204030204" pitchFamily="49" charset="0"/>
+              </a:rPr>
+              <a:t>                    </a:t>
+            </a:r>
+            <a:r>
+              <a:rPr lang="en-US" sz="2400" dirty="0" smtClean="0">
+                <a:solidFill>
+                  <a:srgbClr val="000000"/>
+                </a:solidFill>
+                <a:highlight>
+                  <a:srgbClr val="FFFFFF"/>
+                </a:highlight>
+                <a:latin typeface="Consolas" panose="020B0609020204030204" pitchFamily="49" charset="0"/>
+              </a:rPr>
+              <a:t>.</a:t>
+            </a:r>
+            <a:r>
+              <a:rPr lang="en-US" sz="2400" dirty="0">
+                <a:solidFill>
+                  <a:srgbClr val="000000"/>
+                </a:solidFill>
+                <a:highlight>
+                  <a:srgbClr val="FFFFFF"/>
+                </a:highlight>
+                <a:latin typeface="Consolas" panose="020B0609020204030204" pitchFamily="49" charset="0"/>
+              </a:rPr>
+              <a:t>Where(o=&gt;</a:t>
+            </a:r>
+            <a:r>
+              <a:rPr lang="en-US" sz="2400" dirty="0" err="1">
+                <a:solidFill>
+                  <a:srgbClr val="000000"/>
+                </a:solidFill>
+                <a:highlight>
+                  <a:srgbClr val="FFFFFF"/>
+                </a:highlight>
+                <a:latin typeface="Consolas" panose="020B0609020204030204" pitchFamily="49" charset="0"/>
+              </a:rPr>
+              <a:t>o.Title.Contains</a:t>
+            </a:r>
+            <a:r>
+              <a:rPr lang="en-US" sz="2400" dirty="0">
+                <a:solidFill>
+                  <a:srgbClr val="000000"/>
+                </a:solidFill>
+                <a:highlight>
+                  <a:srgbClr val="FFFFFF"/>
+                </a:highlight>
+                <a:latin typeface="Consolas" panose="020B0609020204030204" pitchFamily="49" charset="0"/>
+              </a:rPr>
+              <a:t>(search))</a:t>
+            </a:r>
+          </a:p>
+          <a:p>
+            <a:r>
+              <a:rPr lang="en-US" sz="2400" dirty="0">
+                <a:solidFill>
+                  <a:srgbClr val="000000"/>
+                </a:solidFill>
+                <a:highlight>
+                  <a:srgbClr val="FFFFFF"/>
+                </a:highlight>
+                <a:latin typeface="Consolas" panose="020B0609020204030204" pitchFamily="49" charset="0"/>
+              </a:rPr>
+              <a:t>                    .</a:t>
+            </a:r>
+            <a:r>
+              <a:rPr lang="en-US" sz="2400" dirty="0" err="1">
+                <a:solidFill>
+                  <a:schemeClr val="accent6"/>
+                </a:solidFill>
+                <a:highlight>
+                  <a:srgbClr val="FFFFFF"/>
+                </a:highlight>
+                <a:latin typeface="Consolas" panose="020B0609020204030204" pitchFamily="49" charset="0"/>
+              </a:rPr>
+              <a:t>ToList</a:t>
+            </a:r>
+            <a:r>
+              <a:rPr lang="en-US" sz="2400" dirty="0" smtClean="0">
+                <a:solidFill>
+                  <a:schemeClr val="accent6"/>
+                </a:solidFill>
+                <a:highlight>
+                  <a:srgbClr val="FFFFFF"/>
+                </a:highlight>
+                <a:latin typeface="Consolas" panose="020B0609020204030204" pitchFamily="49" charset="0"/>
+              </a:rPr>
+              <a:t>()</a:t>
+            </a:r>
+            <a:r>
+              <a:rPr lang="en-US" sz="2400" dirty="0" smtClean="0">
+                <a:solidFill>
+                  <a:srgbClr val="000000"/>
+                </a:solidFill>
+                <a:highlight>
+                  <a:srgbClr val="FFFFFF"/>
+                </a:highlight>
+                <a:latin typeface="Consolas" panose="020B0609020204030204" pitchFamily="49" charset="0"/>
+              </a:rPr>
+              <a:t>);</a:t>
+            </a:r>
+          </a:p>
+          <a:p>
+            <a:r>
+              <a:rPr lang="en-US" sz="2400" dirty="0">
+                <a:solidFill>
+                  <a:srgbClr val="000000"/>
+                </a:solidFill>
+                <a:highlight>
+                  <a:srgbClr val="FFFFFF"/>
+                </a:highlight>
+                <a:latin typeface="Consolas" panose="020B0609020204030204" pitchFamily="49" charset="0"/>
+              </a:rPr>
+              <a:t> </a:t>
+            </a:r>
+            <a:r>
+              <a:rPr lang="en-US" sz="2400" dirty="0" smtClean="0">
+                <a:solidFill>
+                  <a:srgbClr val="000000"/>
+                </a:solidFill>
+                <a:highlight>
+                  <a:srgbClr val="FFFFFF"/>
+                </a:highlight>
+                <a:latin typeface="Consolas" panose="020B0609020204030204" pitchFamily="49" charset="0"/>
+              </a:rPr>
+              <a:t>   </a:t>
+            </a:r>
+            <a:r>
+              <a:rPr lang="en-US" sz="2400" dirty="0" smtClean="0">
+                <a:solidFill>
+                  <a:srgbClr val="0000FF"/>
+                </a:solidFill>
+                <a:highlight>
+                  <a:srgbClr val="FFFFFF"/>
+                </a:highlight>
+                <a:latin typeface="Consolas" panose="020B0609020204030204" pitchFamily="49" charset="0"/>
+              </a:rPr>
+              <a:t>return</a:t>
+            </a:r>
+            <a:r>
+              <a:rPr lang="en-US" sz="2400" dirty="0" smtClean="0">
+                <a:solidFill>
+                  <a:srgbClr val="000000"/>
+                </a:solidFill>
+                <a:highlight>
+                  <a:srgbClr val="FFFFFF"/>
+                </a:highlight>
+                <a:latin typeface="Consolas" panose="020B0609020204030204" pitchFamily="49" charset="0"/>
+              </a:rPr>
+              <a:t> </a:t>
+            </a:r>
+            <a:r>
+              <a:rPr lang="en-US" sz="2400" dirty="0">
+                <a:solidFill>
+                  <a:srgbClr val="000000"/>
+                </a:solidFill>
+                <a:highlight>
+                  <a:srgbClr val="FFFFFF"/>
+                </a:highlight>
+                <a:latin typeface="Consolas" panose="020B0609020204030204" pitchFamily="49" charset="0"/>
+              </a:rPr>
+              <a:t>View(albums);</a:t>
+            </a:r>
+          </a:p>
+          <a:p>
+            <a:r>
+              <a:rPr lang="en-US" sz="2400" dirty="0">
+                <a:solidFill>
+                  <a:srgbClr val="000000"/>
+                </a:solidFill>
+                <a:highlight>
+                  <a:srgbClr val="FFFFFF"/>
+                </a:highlight>
+                <a:latin typeface="Consolas" panose="020B0609020204030204" pitchFamily="49" charset="0"/>
+              </a:rPr>
+              <a:t>}</a:t>
+            </a:r>
+            <a:endParaRPr lang="en-US" sz="2400" dirty="0"/>
+          </a:p>
+        </p:txBody>
+      </p:sp>
+    </p:spTree>
+    <p:extLst>
+      <p:ext uri="{BB962C8B-B14F-4D97-AF65-F5344CB8AC3E}">
+        <p14:creationId xmlns:p14="http://schemas.microsoft.com/office/powerpoint/2010/main" val="785958327"/>
+      </p:ext>
+    </p:extLst>
+  </p:cSld>
+  <p:clrMapOvr>
+    <a:masterClrMapping/>
+  </p:clrMapOvr>
+  <p:timing>
+    <p:tnLst>
+      <p:par>
+        <p:cTn id="1" dur="indefinite" restart="never" nodeType="tmRoot"/>
+      </p:par>
+    </p:tnLst>
+  </p:timing>
+</p:sld>
+</file>
+
+<file path=ppt/slides/slide15.xml><?xml version="1.0" encoding="utf-8"?>
+<p:sld xmlns:a="http://schemas.openxmlformats.org/drawingml/2006/main" xmlns:r="http://schemas.openxmlformats.org/officeDocument/2006/relationships" xmlns:p="http://schemas.openxmlformats.org/presentationml/2006/main">
+  <p:cSld>
+    <p:spTree>
+      <p:nvGrpSpPr>
+        <p:cNvPr id="1" name=""/>
+        <p:cNvGrpSpPr/>
+        <p:nvPr/>
+      </p:nvGrpSpPr>
+      <p:grpSpPr>
+        <a:xfrm>
+          <a:off x="0" y="0"/>
+          <a:ext cx="0" cy="0"/>
+          <a:chOff x="0" y="0"/>
+          <a:chExt cx="0" cy="0"/>
+        </a:xfrm>
+      </p:grpSpPr>
+      <p:sp>
+        <p:nvSpPr>
+          <p:cNvPr id="2" name="Title 1"/>
+          <p:cNvSpPr>
+            <a:spLocks noGrp="1"/>
+          </p:cNvSpPr>
+          <p:nvPr>
+            <p:ph type="title"/>
+          </p:nvPr>
+        </p:nvSpPr>
+        <p:spPr/>
+        <p:txBody>
+          <a:bodyPr/>
+          <a:lstStyle/>
+          <a:p>
+            <a:r>
+              <a:rPr lang="en-US" dirty="0" smtClean="0"/>
+              <a:t>Watch out for…</a:t>
+            </a:r>
+            <a:endParaRPr lang="en-US" dirty="0"/>
+          </a:p>
+        </p:txBody>
+      </p:sp>
+      <p:sp>
+        <p:nvSpPr>
+          <p:cNvPr id="3" name="Content Placeholder 2"/>
+          <p:cNvSpPr>
+            <a:spLocks noGrp="1"/>
+          </p:cNvSpPr>
+          <p:nvPr>
+            <p:ph sz="quarter" idx="10"/>
+          </p:nvPr>
+        </p:nvSpPr>
+        <p:spPr/>
+        <p:txBody>
+          <a:bodyPr/>
+          <a:lstStyle/>
+          <a:p>
+            <a:r>
+              <a:rPr lang="en-US" dirty="0"/>
+              <a:t>If you have </a:t>
+            </a:r>
+            <a:r>
+              <a:rPr lang="en-US" dirty="0" smtClean="0"/>
+              <a:t>two+ </a:t>
+            </a:r>
+            <a:r>
+              <a:rPr lang="en-US" dirty="0"/>
+              <a:t>context </a:t>
+            </a:r>
+            <a:r>
+              <a:rPr lang="en-US" dirty="0" smtClean="0"/>
+              <a:t>classes</a:t>
+            </a:r>
+          </a:p>
+          <a:p>
+            <a:pPr lvl="1"/>
+            <a:r>
+              <a:rPr lang="en-US" dirty="0" smtClean="0"/>
+              <a:t>One </a:t>
+            </a:r>
+            <a:r>
+              <a:rPr lang="en-US" dirty="0"/>
+              <a:t>from </a:t>
+            </a:r>
+            <a:r>
+              <a:rPr lang="en-US" dirty="0" smtClean="0"/>
+              <a:t>selecting </a:t>
+            </a:r>
+            <a:r>
+              <a:rPr lang="en-US" dirty="0" err="1" smtClean="0"/>
+              <a:t>auth</a:t>
+            </a:r>
+            <a:r>
+              <a:rPr lang="en-US" dirty="0" smtClean="0"/>
+              <a:t> during app creation (Identity)</a:t>
+            </a:r>
+            <a:endParaRPr lang="en-US" dirty="0"/>
+          </a:p>
+          <a:p>
+            <a:pPr lvl="1"/>
+            <a:r>
+              <a:rPr lang="en-US" dirty="0"/>
+              <a:t>One for your other entities</a:t>
+            </a:r>
+          </a:p>
+          <a:p>
+            <a:pPr marL="0" indent="0">
+              <a:buNone/>
+            </a:pPr>
+            <a:r>
+              <a:rPr lang="en-US" dirty="0" smtClean="0"/>
+              <a:t>   Migrations should specify separate folders</a:t>
+            </a:r>
+          </a:p>
+          <a:p>
+            <a:pPr marL="0" indent="0">
+              <a:buNone/>
+            </a:pPr>
+            <a:r>
+              <a:rPr lang="en-US" sz="2800" dirty="0">
+                <a:solidFill>
+                  <a:schemeClr val="accent6"/>
+                </a:solidFill>
+              </a:rPr>
+              <a:t>	</a:t>
+            </a:r>
+            <a:r>
+              <a:rPr lang="en-US" sz="2800" dirty="0">
+                <a:solidFill>
+                  <a:schemeClr val="accent6"/>
+                </a:solidFill>
+              </a:rPr>
+              <a:t> </a:t>
+            </a:r>
+            <a:r>
+              <a:rPr lang="en-US" sz="2800" dirty="0" smtClean="0">
+                <a:solidFill>
+                  <a:schemeClr val="accent6"/>
+                </a:solidFill>
+              </a:rPr>
+              <a:t>Enable-Migrations </a:t>
+            </a:r>
+            <a:r>
+              <a:rPr lang="en-US" sz="2800" dirty="0" smtClean="0"/>
+              <a:t>–</a:t>
+            </a:r>
+            <a:r>
+              <a:rPr lang="en-US" sz="2800" dirty="0" err="1" smtClean="0"/>
+              <a:t>MigrationsDirectory</a:t>
+            </a:r>
+            <a:r>
+              <a:rPr lang="en-US" sz="2800" dirty="0" smtClean="0"/>
+              <a:t> </a:t>
+            </a:r>
+            <a:r>
+              <a:rPr lang="en-US" sz="2800" dirty="0" err="1" smtClean="0"/>
+              <a:t>IdentityMigrations</a:t>
+            </a:r>
+            <a:endParaRPr lang="en-US" sz="2800" dirty="0" smtClean="0"/>
+          </a:p>
+          <a:p>
+            <a:pPr marL="0" indent="0">
+              <a:buNone/>
+            </a:pPr>
+            <a:r>
+              <a:rPr lang="en-US" sz="2800" dirty="0">
+                <a:solidFill>
+                  <a:schemeClr val="accent6"/>
+                </a:solidFill>
+              </a:rPr>
+              <a:t>	 Enable-Migrations </a:t>
+            </a:r>
+            <a:r>
+              <a:rPr lang="en-US" sz="2800" dirty="0"/>
+              <a:t>–</a:t>
+            </a:r>
+            <a:r>
+              <a:rPr lang="en-US" sz="2800" dirty="0" err="1"/>
+              <a:t>MigrationsDirectory</a:t>
+            </a:r>
+            <a:r>
+              <a:rPr lang="en-US" sz="2800" dirty="0"/>
+              <a:t> </a:t>
+            </a:r>
+            <a:r>
+              <a:rPr lang="en-US" sz="2800" dirty="0" err="1" smtClean="0"/>
+              <a:t>MusicStoreMigrations</a:t>
+            </a:r>
+            <a:endParaRPr lang="en-US" sz="2800" dirty="0"/>
+          </a:p>
+          <a:p>
+            <a:r>
+              <a:rPr lang="en-US" dirty="0" smtClean="0"/>
+              <a:t>For complex joins, keep an eye on queries</a:t>
+            </a:r>
+          </a:p>
+          <a:p>
+            <a:r>
+              <a:rPr lang="en-US" dirty="0" smtClean="0"/>
+              <a:t>Doing lots of inserts? </a:t>
+            </a:r>
+            <a:r>
+              <a:rPr lang="en-US" dirty="0" err="1" smtClean="0"/>
+              <a:t>AutoDetectChangesEnabled</a:t>
+            </a:r>
+            <a:r>
+              <a:rPr lang="en-US" dirty="0" smtClean="0"/>
+              <a:t> = false;</a:t>
+            </a:r>
+            <a:endParaRPr lang="en-US" dirty="0"/>
+          </a:p>
+        </p:txBody>
+      </p:sp>
+    </p:spTree>
+    <p:extLst>
+      <p:ext uri="{BB962C8B-B14F-4D97-AF65-F5344CB8AC3E}">
+        <p14:creationId xmlns:p14="http://schemas.microsoft.com/office/powerpoint/2010/main" val="91583315"/>
+      </p:ext>
+    </p:extLst>
+  </p:cSld>
+  <p:clrMapOvr>
+    <a:masterClrMapping/>
+  </p:clrMapOvr>
+  <p:timing>
+    <p:tnLst>
+      <p:par>
+        <p:cTn id="1" dur="indefinite" restart="never" nodeType="tmRoot"/>
+      </p:par>
+    </p:tnLst>
+  </p:timing>
+</p:sld>
+</file>
+
+<file path=ppt/slides/slide16.xml><?xml version="1.0" encoding="utf-8"?>
+<p:sld xmlns:a="http://schemas.openxmlformats.org/drawingml/2006/main" xmlns:r="http://schemas.openxmlformats.org/officeDocument/2006/relationships" xmlns:p="http://schemas.openxmlformats.org/presentationml/2006/main">
+  <p:cSld>
+    <p:spTree>
+      <p:nvGrpSpPr>
+        <p:cNvPr id="1" name=""/>
+        <p:cNvGrpSpPr/>
+        <p:nvPr/>
+      </p:nvGrpSpPr>
+      <p:grpSpPr>
+        <a:xfrm>
+          <a:off x="0" y="0"/>
+          <a:ext cx="0" cy="0"/>
+          <a:chOff x="0" y="0"/>
+          <a:chExt cx="0" cy="0"/>
+        </a:xfrm>
+      </p:grpSpPr>
+      <p:sp>
+        <p:nvSpPr>
+          <p:cNvPr id="2" name="Title 1"/>
+          <p:cNvSpPr>
+            <a:spLocks noGrp="1"/>
+          </p:cNvSpPr>
+          <p:nvPr>
+            <p:ph type="title"/>
+          </p:nvPr>
+        </p:nvSpPr>
+        <p:spPr/>
+        <p:txBody>
+          <a:bodyPr/>
+          <a:lstStyle/>
+          <a:p>
+            <a:r>
+              <a:rPr lang="en-US" dirty="0" err="1" smtClean="0"/>
+              <a:t>Async</a:t>
+            </a:r>
+            <a:r>
+              <a:rPr lang="en-US" dirty="0" smtClean="0"/>
+              <a:t> when appropriate</a:t>
+            </a:r>
+            <a:endParaRPr lang="en-US" dirty="0"/>
+          </a:p>
+        </p:txBody>
+      </p:sp>
+      <p:sp>
+        <p:nvSpPr>
+          <p:cNvPr id="3" name="Content Placeholder 2"/>
+          <p:cNvSpPr>
+            <a:spLocks noGrp="1"/>
+          </p:cNvSpPr>
+          <p:nvPr>
+            <p:ph sz="quarter" idx="10"/>
+          </p:nvPr>
+        </p:nvSpPr>
+        <p:spPr/>
+        <p:txBody>
+          <a:bodyPr/>
+          <a:lstStyle/>
+          <a:p>
+            <a:r>
+              <a:rPr lang="en-US" dirty="0" smtClean="0"/>
+              <a:t>EF supports </a:t>
+            </a:r>
+            <a:r>
+              <a:rPr lang="en-US" dirty="0" err="1" smtClean="0"/>
+              <a:t>async</a:t>
+            </a:r>
+            <a:r>
+              <a:rPr lang="en-US" dirty="0" smtClean="0"/>
+              <a:t> queries</a:t>
+            </a:r>
+          </a:p>
+          <a:p>
+            <a:pPr lvl="1"/>
+            <a:r>
+              <a:rPr lang="en-US" dirty="0" err="1" smtClean="0"/>
+              <a:t>Async</a:t>
+            </a:r>
+            <a:r>
+              <a:rPr lang="en-US" dirty="0" smtClean="0"/>
+              <a:t> allows current thread to be used elsewhere</a:t>
+            </a:r>
+          </a:p>
+          <a:p>
+            <a:r>
+              <a:rPr lang="en-US" dirty="0" smtClean="0"/>
+              <a:t>Useful in case of network, </a:t>
+            </a:r>
+            <a:r>
+              <a:rPr lang="en-US" dirty="0" err="1" smtClean="0"/>
+              <a:t>db</a:t>
+            </a:r>
+            <a:r>
+              <a:rPr lang="en-US" dirty="0" smtClean="0"/>
+              <a:t> delays (long operations)</a:t>
+            </a:r>
+          </a:p>
+          <a:p>
+            <a:pPr lvl="1"/>
+            <a:r>
+              <a:rPr lang="en-US" dirty="0" smtClean="0"/>
+              <a:t>Although not all the time, caution of overloading </a:t>
+            </a:r>
+            <a:r>
+              <a:rPr lang="en-US" dirty="0" err="1" smtClean="0"/>
+              <a:t>db</a:t>
+            </a:r>
+            <a:endParaRPr lang="en-US" dirty="0" smtClean="0"/>
+          </a:p>
+          <a:p>
+            <a:pPr lvl="1"/>
+            <a:endParaRPr lang="en-US" dirty="0"/>
+          </a:p>
+        </p:txBody>
+      </p:sp>
+      <p:sp>
+        <p:nvSpPr>
+          <p:cNvPr id="4" name="TextBox 3"/>
+          <p:cNvSpPr txBox="1"/>
+          <p:nvPr/>
+        </p:nvSpPr>
+        <p:spPr>
+          <a:xfrm>
+            <a:off x="887894" y="3651039"/>
+            <a:ext cx="9886122" cy="3170099"/>
+          </a:xfrm>
+          <a:prstGeom prst="rect">
+            <a:avLst/>
+          </a:prstGeom>
+          <a:noFill/>
+        </p:spPr>
+        <p:txBody>
+          <a:bodyPr wrap="square" rtlCol="0">
+            <a:spAutoFit/>
+          </a:bodyPr>
+          <a:lstStyle/>
+          <a:p>
+            <a:r>
+              <a:rPr lang="en-US" sz="2000" dirty="0" smtClean="0">
+                <a:solidFill>
+                  <a:srgbClr val="0000FF"/>
+                </a:solidFill>
+                <a:highlight>
+                  <a:srgbClr val="FFFFFF"/>
+                </a:highlight>
+                <a:latin typeface="Consolas" panose="020B0609020204030204" pitchFamily="49" charset="0"/>
+              </a:rPr>
+              <a:t>public</a:t>
+            </a:r>
+            <a:r>
+              <a:rPr lang="en-US" sz="2000" dirty="0" smtClean="0">
+                <a:solidFill>
+                  <a:srgbClr val="000000"/>
+                </a:solidFill>
+                <a:highlight>
+                  <a:srgbClr val="FFFFFF"/>
+                </a:highlight>
+                <a:latin typeface="Consolas" panose="020B0609020204030204" pitchFamily="49" charset="0"/>
+              </a:rPr>
+              <a:t> </a:t>
+            </a:r>
+            <a:r>
+              <a:rPr lang="en-US" sz="2000" b="1" dirty="0" err="1">
+                <a:solidFill>
+                  <a:srgbClr val="0000FF"/>
+                </a:solidFill>
+                <a:highlight>
+                  <a:srgbClr val="FFFFFF"/>
+                </a:highlight>
+                <a:latin typeface="Consolas" panose="020B0609020204030204" pitchFamily="49" charset="0"/>
+              </a:rPr>
+              <a:t>async</a:t>
+            </a:r>
+            <a:r>
+              <a:rPr lang="en-US" sz="2000" b="1" dirty="0">
+                <a:solidFill>
+                  <a:srgbClr val="000000"/>
+                </a:solidFill>
+                <a:highlight>
+                  <a:srgbClr val="FFFFFF"/>
+                </a:highlight>
+                <a:latin typeface="Consolas" panose="020B0609020204030204" pitchFamily="49" charset="0"/>
+              </a:rPr>
+              <a:t> </a:t>
+            </a:r>
+            <a:r>
+              <a:rPr lang="en-US" sz="2000" b="1" dirty="0">
+                <a:solidFill>
+                  <a:srgbClr val="2B91AF"/>
+                </a:solidFill>
+                <a:highlight>
+                  <a:srgbClr val="FFFFFF"/>
+                </a:highlight>
+                <a:latin typeface="Consolas" panose="020B0609020204030204" pitchFamily="49" charset="0"/>
+              </a:rPr>
+              <a:t>Task</a:t>
+            </a:r>
+            <a:r>
+              <a:rPr lang="en-US" sz="2000" b="1" dirty="0">
+                <a:solidFill>
+                  <a:srgbClr val="000000"/>
+                </a:solidFill>
+                <a:highlight>
+                  <a:srgbClr val="FFFFFF"/>
+                </a:highlight>
+                <a:latin typeface="Consolas" panose="020B0609020204030204" pitchFamily="49" charset="0"/>
+              </a:rPr>
+              <a:t>&lt;</a:t>
+            </a:r>
+            <a:r>
+              <a:rPr lang="en-US" sz="2000" b="1" dirty="0" err="1">
+                <a:solidFill>
+                  <a:srgbClr val="2B91AF"/>
+                </a:solidFill>
+                <a:highlight>
+                  <a:srgbClr val="FFFFFF"/>
+                </a:highlight>
+                <a:latin typeface="Consolas" panose="020B0609020204030204" pitchFamily="49" charset="0"/>
+              </a:rPr>
+              <a:t>ActionResult</a:t>
+            </a:r>
+            <a:r>
+              <a:rPr lang="en-US" sz="2000" b="1" dirty="0">
+                <a:solidFill>
+                  <a:srgbClr val="000000"/>
+                </a:solidFill>
+                <a:highlight>
+                  <a:srgbClr val="FFFFFF"/>
+                </a:highlight>
+                <a:latin typeface="Consolas" panose="020B0609020204030204" pitchFamily="49" charset="0"/>
+              </a:rPr>
+              <a:t>&gt; </a:t>
+            </a:r>
+            <a:r>
+              <a:rPr lang="en-US" sz="2000" dirty="0" smtClean="0">
+                <a:solidFill>
+                  <a:srgbClr val="000000"/>
+                </a:solidFill>
+                <a:highlight>
+                  <a:srgbClr val="FFFFFF"/>
+                </a:highlight>
+                <a:latin typeface="Consolas" panose="020B0609020204030204" pitchFamily="49" charset="0"/>
+              </a:rPr>
+              <a:t>Create(…)</a:t>
+            </a:r>
+            <a:endParaRPr lang="en-US" sz="2000" dirty="0">
+              <a:solidFill>
+                <a:srgbClr val="000000"/>
+              </a:solidFill>
+              <a:highlight>
+                <a:srgbClr val="FFFFFF"/>
+              </a:highlight>
+              <a:latin typeface="Consolas" panose="020B0609020204030204" pitchFamily="49" charset="0"/>
+            </a:endParaRPr>
+          </a:p>
+          <a:p>
+            <a:r>
+              <a:rPr lang="en-US" sz="2000" dirty="0">
+                <a:solidFill>
+                  <a:srgbClr val="000000"/>
+                </a:solidFill>
+                <a:highlight>
+                  <a:srgbClr val="FFFFFF"/>
+                </a:highlight>
+                <a:latin typeface="Consolas" panose="020B0609020204030204" pitchFamily="49" charset="0"/>
+              </a:rPr>
+              <a:t>{</a:t>
+            </a:r>
+          </a:p>
+          <a:p>
+            <a:r>
+              <a:rPr lang="en-US" sz="2000" dirty="0">
+                <a:solidFill>
+                  <a:srgbClr val="000000"/>
+                </a:solidFill>
+                <a:highlight>
+                  <a:srgbClr val="FFFFFF"/>
+                </a:highlight>
+                <a:latin typeface="Consolas" panose="020B0609020204030204" pitchFamily="49" charset="0"/>
+              </a:rPr>
+              <a:t>    </a:t>
+            </a:r>
+            <a:r>
+              <a:rPr lang="en-US" sz="2000" dirty="0">
+                <a:solidFill>
+                  <a:srgbClr val="0000FF"/>
+                </a:solidFill>
+                <a:highlight>
+                  <a:srgbClr val="FFFFFF"/>
+                </a:highlight>
+                <a:latin typeface="Consolas" panose="020B0609020204030204" pitchFamily="49" charset="0"/>
+              </a:rPr>
+              <a:t>if</a:t>
+            </a:r>
+            <a:r>
+              <a:rPr lang="en-US" sz="2000" dirty="0">
+                <a:solidFill>
+                  <a:srgbClr val="000000"/>
+                </a:solidFill>
+                <a:highlight>
+                  <a:srgbClr val="FFFFFF"/>
+                </a:highlight>
+                <a:latin typeface="Consolas" panose="020B0609020204030204" pitchFamily="49" charset="0"/>
+              </a:rPr>
+              <a:t> (</a:t>
+            </a:r>
+            <a:r>
+              <a:rPr lang="en-US" sz="2000" dirty="0" err="1">
+                <a:solidFill>
+                  <a:srgbClr val="000000"/>
+                </a:solidFill>
+                <a:highlight>
+                  <a:srgbClr val="FFFFFF"/>
+                </a:highlight>
+                <a:latin typeface="Consolas" panose="020B0609020204030204" pitchFamily="49" charset="0"/>
+              </a:rPr>
+              <a:t>ModelState.IsValid</a:t>
+            </a:r>
+            <a:r>
+              <a:rPr lang="en-US" sz="2000" dirty="0">
+                <a:solidFill>
+                  <a:srgbClr val="000000"/>
+                </a:solidFill>
+                <a:highlight>
+                  <a:srgbClr val="FFFFFF"/>
+                </a:highlight>
+                <a:latin typeface="Consolas" panose="020B0609020204030204" pitchFamily="49" charset="0"/>
+              </a:rPr>
+              <a:t>)</a:t>
+            </a:r>
+          </a:p>
+          <a:p>
+            <a:r>
+              <a:rPr lang="en-US" sz="2000" dirty="0">
+                <a:solidFill>
+                  <a:srgbClr val="000000"/>
+                </a:solidFill>
+                <a:highlight>
+                  <a:srgbClr val="FFFFFF"/>
+                </a:highlight>
+                <a:latin typeface="Consolas" panose="020B0609020204030204" pitchFamily="49" charset="0"/>
+              </a:rPr>
+              <a:t>    {</a:t>
+            </a:r>
+          </a:p>
+          <a:p>
+            <a:r>
+              <a:rPr lang="en-US" sz="2000" dirty="0">
+                <a:solidFill>
+                  <a:srgbClr val="000000"/>
+                </a:solidFill>
+                <a:highlight>
+                  <a:srgbClr val="FFFFFF"/>
+                </a:highlight>
+                <a:latin typeface="Consolas" panose="020B0609020204030204" pitchFamily="49" charset="0"/>
+              </a:rPr>
+              <a:t>        </a:t>
+            </a:r>
+            <a:r>
+              <a:rPr lang="en-US" sz="2000" dirty="0" err="1">
+                <a:solidFill>
+                  <a:srgbClr val="000000"/>
+                </a:solidFill>
+                <a:highlight>
+                  <a:srgbClr val="FFFFFF"/>
+                </a:highlight>
+                <a:latin typeface="Consolas" panose="020B0609020204030204" pitchFamily="49" charset="0"/>
+              </a:rPr>
+              <a:t>db.Albums.Add</a:t>
+            </a:r>
+            <a:r>
+              <a:rPr lang="en-US" sz="2000" dirty="0">
+                <a:solidFill>
+                  <a:srgbClr val="000000"/>
+                </a:solidFill>
+                <a:highlight>
+                  <a:srgbClr val="FFFFFF"/>
+                </a:highlight>
+                <a:latin typeface="Consolas" panose="020B0609020204030204" pitchFamily="49" charset="0"/>
+              </a:rPr>
+              <a:t>(album);</a:t>
+            </a:r>
+          </a:p>
+          <a:p>
+            <a:r>
+              <a:rPr lang="en-US" sz="2000" dirty="0">
+                <a:solidFill>
+                  <a:srgbClr val="000000"/>
+                </a:solidFill>
+                <a:highlight>
+                  <a:srgbClr val="FFFFFF"/>
+                </a:highlight>
+                <a:latin typeface="Consolas" panose="020B0609020204030204" pitchFamily="49" charset="0"/>
+              </a:rPr>
+              <a:t>        </a:t>
+            </a:r>
+            <a:r>
+              <a:rPr lang="en-US" sz="2000" dirty="0">
+                <a:solidFill>
+                  <a:srgbClr val="0000FF"/>
+                </a:solidFill>
+                <a:highlight>
+                  <a:srgbClr val="FFFFFF"/>
+                </a:highlight>
+                <a:latin typeface="Consolas" panose="020B0609020204030204" pitchFamily="49" charset="0"/>
+              </a:rPr>
+              <a:t>await</a:t>
+            </a:r>
+            <a:r>
+              <a:rPr lang="en-US" sz="2000" dirty="0">
+                <a:solidFill>
+                  <a:srgbClr val="000000"/>
+                </a:solidFill>
+                <a:highlight>
+                  <a:srgbClr val="FFFFFF"/>
+                </a:highlight>
+                <a:latin typeface="Consolas" panose="020B0609020204030204" pitchFamily="49" charset="0"/>
+              </a:rPr>
+              <a:t> </a:t>
+            </a:r>
+            <a:r>
+              <a:rPr lang="en-US" sz="2000" b="1" dirty="0" err="1">
+                <a:highlight>
+                  <a:srgbClr val="FFFFFF"/>
+                </a:highlight>
+                <a:latin typeface="Consolas" panose="020B0609020204030204" pitchFamily="49" charset="0"/>
+              </a:rPr>
+              <a:t>db.SaveChangesAsync</a:t>
+            </a:r>
+            <a:r>
+              <a:rPr lang="en-US" sz="2000" dirty="0">
+                <a:solidFill>
+                  <a:srgbClr val="000000"/>
+                </a:solidFill>
+                <a:highlight>
+                  <a:srgbClr val="FFFFFF"/>
+                </a:highlight>
+                <a:latin typeface="Consolas" panose="020B0609020204030204" pitchFamily="49" charset="0"/>
+              </a:rPr>
+              <a:t>();</a:t>
+            </a:r>
+          </a:p>
+          <a:p>
+            <a:r>
+              <a:rPr lang="en-US" sz="2000" dirty="0">
+                <a:solidFill>
+                  <a:srgbClr val="000000"/>
+                </a:solidFill>
+                <a:highlight>
+                  <a:srgbClr val="FFFFFF"/>
+                </a:highlight>
+                <a:latin typeface="Consolas" panose="020B0609020204030204" pitchFamily="49" charset="0"/>
+              </a:rPr>
+              <a:t>        </a:t>
+            </a:r>
+            <a:r>
+              <a:rPr lang="en-US" sz="2000" dirty="0">
+                <a:solidFill>
+                  <a:srgbClr val="0000FF"/>
+                </a:solidFill>
+                <a:highlight>
+                  <a:srgbClr val="FFFFFF"/>
+                </a:highlight>
+                <a:latin typeface="Consolas" panose="020B0609020204030204" pitchFamily="49" charset="0"/>
+              </a:rPr>
+              <a:t>return</a:t>
+            </a:r>
+            <a:r>
+              <a:rPr lang="en-US" sz="2000" dirty="0">
+                <a:solidFill>
+                  <a:srgbClr val="000000"/>
+                </a:solidFill>
+                <a:highlight>
+                  <a:srgbClr val="FFFFFF"/>
+                </a:highlight>
+                <a:latin typeface="Consolas" panose="020B0609020204030204" pitchFamily="49" charset="0"/>
+              </a:rPr>
+              <a:t> </a:t>
+            </a:r>
+            <a:r>
+              <a:rPr lang="en-US" sz="2000" dirty="0" err="1">
+                <a:solidFill>
+                  <a:srgbClr val="000000"/>
+                </a:solidFill>
+                <a:highlight>
+                  <a:srgbClr val="FFFFFF"/>
+                </a:highlight>
+                <a:latin typeface="Consolas" panose="020B0609020204030204" pitchFamily="49" charset="0"/>
+              </a:rPr>
+              <a:t>RedirectToAction</a:t>
+            </a:r>
+            <a:r>
+              <a:rPr lang="en-US" sz="2000" dirty="0">
+                <a:solidFill>
+                  <a:srgbClr val="000000"/>
+                </a:solidFill>
+                <a:highlight>
+                  <a:srgbClr val="FFFFFF"/>
+                </a:highlight>
+                <a:latin typeface="Consolas" panose="020B0609020204030204" pitchFamily="49" charset="0"/>
+              </a:rPr>
+              <a:t>(</a:t>
+            </a:r>
+            <a:r>
+              <a:rPr lang="en-US" sz="2000" dirty="0">
+                <a:solidFill>
+                  <a:srgbClr val="A31515"/>
+                </a:solidFill>
+                <a:highlight>
+                  <a:srgbClr val="FFFFFF"/>
+                </a:highlight>
+                <a:latin typeface="Consolas" panose="020B0609020204030204" pitchFamily="49" charset="0"/>
+              </a:rPr>
+              <a:t>"Index"</a:t>
+            </a:r>
+            <a:r>
+              <a:rPr lang="en-US" sz="2000" dirty="0">
+                <a:solidFill>
+                  <a:srgbClr val="000000"/>
+                </a:solidFill>
+                <a:highlight>
+                  <a:srgbClr val="FFFFFF"/>
+                </a:highlight>
+                <a:latin typeface="Consolas" panose="020B0609020204030204" pitchFamily="49" charset="0"/>
+              </a:rPr>
+              <a:t>);</a:t>
+            </a:r>
+          </a:p>
+          <a:p>
+            <a:r>
+              <a:rPr lang="en-US" sz="2000" dirty="0">
+                <a:solidFill>
+                  <a:srgbClr val="000000"/>
+                </a:solidFill>
+                <a:highlight>
+                  <a:srgbClr val="FFFFFF"/>
+                </a:highlight>
+                <a:latin typeface="Consolas" panose="020B0609020204030204" pitchFamily="49" charset="0"/>
+              </a:rPr>
+              <a:t>    </a:t>
+            </a:r>
+            <a:r>
+              <a:rPr lang="en-US" sz="2000" dirty="0" smtClean="0">
+                <a:solidFill>
+                  <a:srgbClr val="000000"/>
+                </a:solidFill>
+                <a:highlight>
+                  <a:srgbClr val="FFFFFF"/>
+                </a:highlight>
+                <a:latin typeface="Consolas" panose="020B0609020204030204" pitchFamily="49" charset="0"/>
+              </a:rPr>
+              <a:t>}</a:t>
+            </a:r>
+            <a:endParaRPr lang="en-US" sz="2000" dirty="0">
+              <a:solidFill>
+                <a:srgbClr val="000000"/>
+              </a:solidFill>
+              <a:highlight>
+                <a:srgbClr val="FFFFFF"/>
+              </a:highlight>
+              <a:latin typeface="Consolas" panose="020B0609020204030204" pitchFamily="49" charset="0"/>
+            </a:endParaRPr>
+          </a:p>
+          <a:p>
+            <a:r>
+              <a:rPr lang="en-US" sz="2000" dirty="0">
+                <a:solidFill>
+                  <a:srgbClr val="000000"/>
+                </a:solidFill>
+                <a:highlight>
+                  <a:srgbClr val="FFFFFF"/>
+                </a:highlight>
+                <a:latin typeface="Consolas" panose="020B0609020204030204" pitchFamily="49" charset="0"/>
+              </a:rPr>
+              <a:t>    </a:t>
+            </a:r>
+            <a:r>
+              <a:rPr lang="en-US" sz="2000" dirty="0">
+                <a:solidFill>
+                  <a:srgbClr val="0000FF"/>
+                </a:solidFill>
+                <a:highlight>
+                  <a:srgbClr val="FFFFFF"/>
+                </a:highlight>
+                <a:latin typeface="Consolas" panose="020B0609020204030204" pitchFamily="49" charset="0"/>
+              </a:rPr>
+              <a:t>return</a:t>
+            </a:r>
+            <a:r>
+              <a:rPr lang="en-US" sz="2000" dirty="0">
+                <a:solidFill>
+                  <a:srgbClr val="000000"/>
+                </a:solidFill>
+                <a:highlight>
+                  <a:srgbClr val="FFFFFF"/>
+                </a:highlight>
+                <a:latin typeface="Consolas" panose="020B0609020204030204" pitchFamily="49" charset="0"/>
+              </a:rPr>
+              <a:t> View(album);</a:t>
+            </a:r>
+          </a:p>
+          <a:p>
+            <a:r>
+              <a:rPr lang="en-US" sz="2000" dirty="0">
+                <a:solidFill>
+                  <a:srgbClr val="000000"/>
+                </a:solidFill>
+                <a:highlight>
+                  <a:srgbClr val="FFFFFF"/>
+                </a:highlight>
+                <a:latin typeface="Consolas" panose="020B0609020204030204" pitchFamily="49" charset="0"/>
+              </a:rPr>
+              <a:t>}</a:t>
+            </a:r>
+            <a:endParaRPr lang="en-US" sz="2000" dirty="0"/>
+          </a:p>
+        </p:txBody>
+      </p:sp>
+    </p:spTree>
+    <p:extLst>
+      <p:ext uri="{BB962C8B-B14F-4D97-AF65-F5344CB8AC3E}">
+        <p14:creationId xmlns:p14="http://schemas.microsoft.com/office/powerpoint/2010/main" val="1910717883"/>
+      </p:ext>
+    </p:extLst>
+  </p:cSld>
+  <p:clrMapOvr>
+    <a:masterClrMapping/>
+  </p:clrMapOvr>
+  <p:timing>
+    <p:tnLst>
+      <p:par>
+        <p:cTn id="1" dur="indefinite" restart="never" nodeType="tmRoot"/>
+      </p:par>
+    </p:tnLst>
+  </p:timing>
+</p:sld>
+</file>
+
+<file path=ppt/slides/slide17.xml><?xml version="1.0" encoding="utf-8"?>
+<p:sld xmlns:a="http://schemas.openxmlformats.org/drawingml/2006/main" xmlns:r="http://schemas.openxmlformats.org/officeDocument/2006/relationships" xmlns:p="http://schemas.openxmlformats.org/presentationml/2006/main">
+  <p:cSld>
+    <p:spTree>
+      <p:nvGrpSpPr>
+        <p:cNvPr id="1" name=""/>
+        <p:cNvGrpSpPr/>
+        <p:nvPr/>
+      </p:nvGrpSpPr>
+      <p:grpSpPr>
+        <a:xfrm>
+          <a:off x="0" y="0"/>
+          <a:ext cx="0" cy="0"/>
+          <a:chOff x="0" y="0"/>
+          <a:chExt cx="0" cy="0"/>
+        </a:xfrm>
+      </p:grpSpPr>
+      <p:sp>
+        <p:nvSpPr>
+          <p:cNvPr id="2" name="Title 1"/>
+          <p:cNvSpPr>
+            <a:spLocks noGrp="1"/>
+          </p:cNvSpPr>
+          <p:nvPr>
+            <p:ph type="title"/>
+          </p:nvPr>
+        </p:nvSpPr>
+        <p:spPr/>
+        <p:txBody>
+          <a:bodyPr>
+            <a:noAutofit/>
+          </a:bodyPr>
+          <a:lstStyle/>
+          <a:p>
+            <a:r>
+              <a:rPr lang="en-GB" dirty="0" smtClean="0"/>
+              <a:t>Consider Connection </a:t>
+            </a:r>
+            <a:r>
+              <a:rPr lang="en-GB" dirty="0"/>
+              <a:t>resiliency</a:t>
+            </a:r>
+            <a:br>
+              <a:rPr lang="en-GB" dirty="0"/>
+            </a:br>
+            <a:endParaRPr lang="en-US" dirty="0"/>
+          </a:p>
+        </p:txBody>
+      </p:sp>
+      <p:sp>
+        <p:nvSpPr>
+          <p:cNvPr id="3" name="Content Placeholder 2"/>
+          <p:cNvSpPr>
+            <a:spLocks noGrp="1"/>
+          </p:cNvSpPr>
+          <p:nvPr>
+            <p:ph sz="quarter" idx="10"/>
+          </p:nvPr>
+        </p:nvSpPr>
+        <p:spPr/>
+        <p:txBody>
+          <a:bodyPr/>
+          <a:lstStyle/>
+          <a:p>
+            <a:r>
+              <a:rPr lang="en-US" dirty="0" smtClean="0"/>
+              <a:t>This is a connection retry policy</a:t>
+            </a:r>
+          </a:p>
+          <a:p>
+            <a:r>
+              <a:rPr lang="en-US" dirty="0" smtClean="0"/>
+              <a:t>Works great with </a:t>
+            </a:r>
+            <a:r>
+              <a:rPr lang="en-US" dirty="0" err="1" smtClean="0">
+                <a:solidFill>
+                  <a:srgbClr val="00B050"/>
+                </a:solidFill>
+              </a:rPr>
+              <a:t>async</a:t>
+            </a:r>
+            <a:endParaRPr lang="en-US" dirty="0" smtClean="0">
+              <a:solidFill>
+                <a:srgbClr val="00B050"/>
+              </a:solidFill>
+            </a:endParaRPr>
+          </a:p>
+          <a:p>
+            <a:r>
+              <a:rPr lang="en-US" dirty="0" smtClean="0"/>
+              <a:t>Four modes</a:t>
+            </a:r>
+          </a:p>
+          <a:p>
+            <a:pPr lvl="1"/>
+            <a:r>
+              <a:rPr lang="en-US" dirty="0" err="1" smtClean="0">
+                <a:solidFill>
+                  <a:schemeClr val="accent6"/>
+                </a:solidFill>
+              </a:rPr>
+              <a:t>DefaultExecutionStrategy</a:t>
+            </a:r>
+            <a:endParaRPr lang="en-US" dirty="0" smtClean="0">
+              <a:solidFill>
+                <a:schemeClr val="accent6"/>
+              </a:solidFill>
+            </a:endParaRPr>
+          </a:p>
+          <a:p>
+            <a:pPr lvl="1"/>
+            <a:r>
+              <a:rPr lang="en-US" dirty="0" err="1">
+                <a:solidFill>
+                  <a:schemeClr val="accent6"/>
+                </a:solidFill>
+              </a:rPr>
+              <a:t>DefaultSqlExecutionStrategy</a:t>
+            </a:r>
+            <a:endParaRPr lang="en-US" dirty="0">
+              <a:solidFill>
+                <a:schemeClr val="accent6"/>
+              </a:solidFill>
+            </a:endParaRPr>
+          </a:p>
+          <a:p>
+            <a:pPr lvl="1"/>
+            <a:r>
+              <a:rPr lang="en-US" dirty="0" err="1">
+                <a:solidFill>
+                  <a:schemeClr val="accent6"/>
+                </a:solidFill>
+              </a:rPr>
+              <a:t>DbExecutionStrategy</a:t>
+            </a:r>
+            <a:endParaRPr lang="en-US" dirty="0">
+              <a:solidFill>
+                <a:schemeClr val="accent6"/>
+              </a:solidFill>
+            </a:endParaRPr>
+          </a:p>
+          <a:p>
+            <a:pPr lvl="1"/>
+            <a:r>
+              <a:rPr lang="en-US" dirty="0" err="1" smtClean="0">
+                <a:solidFill>
+                  <a:schemeClr val="accent6"/>
+                </a:solidFill>
+              </a:rPr>
+              <a:t>SqlAzureExecutionStrategy</a:t>
+            </a:r>
+            <a:endParaRPr lang="en-US" dirty="0" smtClean="0">
+              <a:solidFill>
+                <a:schemeClr val="accent6"/>
+              </a:solidFill>
+            </a:endParaRPr>
+          </a:p>
+          <a:p>
+            <a:r>
+              <a:rPr lang="en-US" dirty="0" smtClean="0"/>
+              <a:t>throws </a:t>
+            </a:r>
+            <a:r>
+              <a:rPr lang="en-US" dirty="0" err="1">
+                <a:solidFill>
+                  <a:schemeClr val="accent6"/>
+                </a:solidFill>
+              </a:rPr>
+              <a:t>RetryLimitExceededException</a:t>
+            </a:r>
+            <a:r>
+              <a:rPr lang="en-US" dirty="0">
+                <a:solidFill>
+                  <a:schemeClr val="accent6"/>
+                </a:solidFill>
+              </a:rPr>
+              <a:t> </a:t>
+            </a:r>
+          </a:p>
+          <a:p>
+            <a:endParaRPr lang="en-US" dirty="0"/>
+          </a:p>
+        </p:txBody>
+      </p:sp>
+    </p:spTree>
+    <p:extLst>
+      <p:ext uri="{BB962C8B-B14F-4D97-AF65-F5344CB8AC3E}">
+        <p14:creationId xmlns:p14="http://schemas.microsoft.com/office/powerpoint/2010/main" val="1975754133"/>
+      </p:ext>
+    </p:extLst>
+  </p:cSld>
+  <p:clrMapOvr>
+    <a:masterClrMapping/>
+  </p:clrMapOvr>
+  <p:timing>
+    <p:tnLst>
+      <p:par>
+        <p:cTn id="1" dur="indefinite" restart="never" nodeType="tmRoot"/>
+      </p:par>
+    </p:tnLst>
+  </p:timing>
+</p:sld>
+</file>
+
+<file path=ppt/slides/slide18.xml><?xml version="1.0" encoding="utf-8"?>
+<p:sld xmlns:a="http://schemas.openxmlformats.org/drawingml/2006/main" xmlns:r="http://schemas.openxmlformats.org/officeDocument/2006/relationships" xmlns:p="http://schemas.openxmlformats.org/presentationml/2006/main">
+  <p:cSld>
+    <p:spTree>
+      <p:nvGrpSpPr>
+        <p:cNvPr id="1" name=""/>
+        <p:cNvGrpSpPr/>
+        <p:nvPr/>
+      </p:nvGrpSpPr>
+      <p:grpSpPr>
+        <a:xfrm>
+          <a:off x="0" y="0"/>
+          <a:ext cx="0" cy="0"/>
+          <a:chOff x="0" y="0"/>
+          <a:chExt cx="0" cy="0"/>
+        </a:xfrm>
+      </p:grpSpPr>
+      <p:sp>
+        <p:nvSpPr>
+          <p:cNvPr id="4" name="Title 3"/>
+          <p:cNvSpPr>
+            <a:spLocks noGrp="1"/>
+          </p:cNvSpPr>
+          <p:nvPr>
+            <p:ph type="title"/>
+          </p:nvPr>
+        </p:nvSpPr>
+        <p:spPr/>
+        <p:txBody>
+          <a:bodyPr/>
+          <a:lstStyle/>
+          <a:p>
+            <a:r>
+              <a:rPr lang="en-US" dirty="0" smtClean="0"/>
+              <a:t>Connection Resiliency &amp; </a:t>
+            </a:r>
+            <a:r>
+              <a:rPr lang="en-US" dirty="0" err="1" smtClean="0"/>
+              <a:t>Async</a:t>
+            </a:r>
+            <a:endParaRPr lang="en-US" dirty="0"/>
+          </a:p>
+        </p:txBody>
+      </p:sp>
+    </p:spTree>
+    <p:extLst>
+      <p:ext uri="{BB962C8B-B14F-4D97-AF65-F5344CB8AC3E}">
+        <p14:creationId xmlns:p14="http://schemas.microsoft.com/office/powerpoint/2010/main" val="1214011916"/>
+      </p:ext>
+    </p:extLst>
+  </p:cSld>
+  <p:clrMapOvr>
+    <a:masterClrMapping/>
+  </p:clrMapOvr>
+  <p:timing>
+    <p:tnLst>
+      <p:par>
+        <p:cTn id="1" dur="indefinite" restart="never" nodeType="tmRoot"/>
+      </p:par>
+    </p:tnLst>
+  </p:timing>
+</p:sld>
+</file>
+
+<file path=ppt/slides/slide19.xml><?xml version="1.0" encoding="utf-8"?>
+<p:sld xmlns:a="http://schemas.openxmlformats.org/drawingml/2006/main" xmlns:r="http://schemas.openxmlformats.org/officeDocument/2006/relationships" xmlns:p="http://schemas.openxmlformats.org/presentationml/2006/main">
+  <p:cSld>
+    <p:spTree>
+      <p:nvGrpSpPr>
+        <p:cNvPr id="1" name=""/>
+        <p:cNvGrpSpPr/>
+        <p:nvPr/>
+      </p:nvGrpSpPr>
+      <p:grpSpPr>
+        <a:xfrm>
+          <a:off x="0" y="0"/>
+          <a:ext cx="0" cy="0"/>
+          <a:chOff x="0" y="0"/>
+          <a:chExt cx="0" cy="0"/>
+        </a:xfrm>
+      </p:grpSpPr>
+      <p:sp>
+        <p:nvSpPr>
+          <p:cNvPr id="4" name="Text Placeholder 3"/>
+          <p:cNvSpPr>
+            <a:spLocks noGrp="1"/>
+          </p:cNvSpPr>
+          <p:nvPr>
+            <p:ph type="body" sz="quarter" idx="10"/>
+          </p:nvPr>
+        </p:nvSpPr>
+        <p:spPr/>
+        <p:txBody>
+          <a:bodyPr/>
+          <a:lstStyle/>
+          <a:p>
+            <a:r>
+              <a:rPr lang="en-GB" dirty="0" smtClean="0"/>
+              <a:t>Looking forward with Entity Framework 7</a:t>
+            </a:r>
+            <a:endParaRPr lang="en-GB" dirty="0"/>
+          </a:p>
+        </p:txBody>
+      </p:sp>
+      <p:sp>
+        <p:nvSpPr>
+          <p:cNvPr id="3" name="Subtitle 2"/>
+          <p:cNvSpPr>
+            <a:spLocks noGrp="1"/>
+          </p:cNvSpPr>
+          <p:nvPr>
+            <p:ph type="subTitle" idx="1"/>
+          </p:nvPr>
+        </p:nvSpPr>
+        <p:spPr/>
+        <p:txBody>
+          <a:bodyPr/>
+          <a:lstStyle/>
+          <a:p>
+            <a:endParaRPr lang="en-US" dirty="0"/>
+          </a:p>
+        </p:txBody>
+      </p:sp>
+    </p:spTree>
+    <p:extLst>
+      <p:ext uri="{BB962C8B-B14F-4D97-AF65-F5344CB8AC3E}">
+        <p14:creationId xmlns:p14="http://schemas.microsoft.com/office/powerpoint/2010/main" val="3442347928"/>
       </p:ext>
     </p:extLst>
   </p:cSld>
@@ -4322,14 +7640,14 @@
                 <a:gridCol w="5762625">
                   <a:extLst>
                     <a:ext uri="{9D8B030D-6E8A-4147-A177-3AD203B41FA5}">
-                      <a16:colId xmlns:a16="http://schemas.microsoft.com/office/drawing/2014/main" xmlns="" val="1632794655"/>
+                      <a16:colId xmlns="" xmlns:a16="http://schemas.microsoft.com/office/drawing/2014/main" val="1632794655"/>
                     </a:ext>
                   </a:extLst>
                 </a:gridCol>
                 <a:gridCol w="5762625">
                   <a:extLst>
                     <a:ext uri="{9D8B030D-6E8A-4147-A177-3AD203B41FA5}">
-                      <a16:colId xmlns:a16="http://schemas.microsoft.com/office/drawing/2014/main" xmlns="" val="2011313899"/>
+                      <a16:colId xmlns="" xmlns:a16="http://schemas.microsoft.com/office/drawing/2014/main" val="2011313899"/>
                     </a:ext>
                   </a:extLst>
                 </a:gridCol>
@@ -4364,7 +7682,7 @@
                 </a:tc>
                 <a:extLst>
                   <a:ext uri="{0D108BD9-81ED-4DB2-BD59-A6C34878D82A}">
-                    <a16:rowId xmlns:a16="http://schemas.microsoft.com/office/drawing/2014/main" xmlns="" val="1789177411"/>
+                    <a16:rowId xmlns="" xmlns:a16="http://schemas.microsoft.com/office/drawing/2014/main" val="1789177411"/>
                   </a:ext>
                 </a:extLst>
               </a:tr>
@@ -4424,7 +7742,7 @@
                 </a:tc>
                 <a:extLst>
                   <a:ext uri="{0D108BD9-81ED-4DB2-BD59-A6C34878D82A}">
-                    <a16:rowId xmlns:a16="http://schemas.microsoft.com/office/drawing/2014/main" xmlns="" val="3842815335"/>
+                    <a16:rowId xmlns="" xmlns:a16="http://schemas.microsoft.com/office/drawing/2014/main" val="3842815335"/>
                   </a:ext>
                 </a:extLst>
               </a:tr>
@@ -4491,7 +7809,7 @@
                 </a:tc>
                 <a:extLst>
                   <a:ext uri="{0D108BD9-81ED-4DB2-BD59-A6C34878D82A}">
-                    <a16:rowId xmlns:a16="http://schemas.microsoft.com/office/drawing/2014/main" xmlns="" val="321066646"/>
+                    <a16:rowId xmlns="" xmlns:a16="http://schemas.microsoft.com/office/drawing/2014/main" val="321066646"/>
                   </a:ext>
                 </a:extLst>
               </a:tr>
@@ -4567,14 +7885,7 @@
                           <a:latin typeface="Segoe UI Light" panose="020B0502040204020203" pitchFamily="34" charset="0"/>
                           <a:cs typeface="Segoe UI Light" panose="020B0502040204020203" pitchFamily="34" charset="0"/>
                         </a:rPr>
-                        <a:t>06 | </a:t>
-                      </a:r>
-                      <a:r>
-                        <a:rPr lang="en-US" sz="2400" dirty="0" smtClean="0">
-                          <a:latin typeface="Segoe UI Light" panose="020B0502040204020203" pitchFamily="34" charset="0"/>
-                          <a:cs typeface="Segoe UI Light" panose="020B0502040204020203" pitchFamily="34" charset="0"/>
-                        </a:rPr>
-                        <a:t>Integrating extra features</a:t>
+                        <a:t>06 | Integrating extra features</a:t>
                       </a:r>
                       <a:r>
                         <a:rPr lang="en-US" sz="2400" baseline="0" dirty="0" smtClean="0">
@@ -4588,14 +7899,7 @@
                           <a:latin typeface="Segoe UI Light" panose="020B0502040204020203" pitchFamily="34" charset="0"/>
                           <a:cs typeface="Segoe UI Light" panose="020B0502040204020203" pitchFamily="34" charset="0"/>
                         </a:rPr>
-                        <a:t>and </a:t>
-                      </a:r>
-                      <a:r>
-                        <a:rPr lang="en-US" sz="2400" dirty="0" smtClean="0">
-                          <a:latin typeface="Segoe UI Light" panose="020B0502040204020203" pitchFamily="34" charset="0"/>
-                          <a:cs typeface="Segoe UI Light" panose="020B0502040204020203" pitchFamily="34" charset="0"/>
-                        </a:rPr>
-                        <a:t>looking forward</a:t>
+                        <a:t>and looking forward</a:t>
                       </a:r>
                     </a:p>
                   </a:txBody>
@@ -4603,7 +7907,7 @@
                 </a:tc>
                 <a:extLst>
                   <a:ext uri="{0D108BD9-81ED-4DB2-BD59-A6C34878D82A}">
-                    <a16:rowId xmlns:a16="http://schemas.microsoft.com/office/drawing/2014/main" xmlns="" val="3812060533"/>
+                    <a16:rowId xmlns="" xmlns:a16="http://schemas.microsoft.com/office/drawing/2014/main" val="3812060533"/>
                   </a:ext>
                 </a:extLst>
               </a:tr>
@@ -4629,6 +7933,315 @@
       <p:transition spd="slow"/>
     </mc:Fallback>
   </mc:AlternateContent>
+  <p:timing>
+    <p:tnLst>
+      <p:par>
+        <p:cTn id="1" dur="indefinite" restart="never" nodeType="tmRoot"/>
+      </p:par>
+    </p:tnLst>
+  </p:timing>
+</p:sld>
+</file>
+
+<file path=ppt/slides/slide20.xml><?xml version="1.0" encoding="utf-8"?>
+<p:sld xmlns:a="http://schemas.openxmlformats.org/drawingml/2006/main" xmlns:r="http://schemas.openxmlformats.org/officeDocument/2006/relationships" xmlns:p="http://schemas.openxmlformats.org/presentationml/2006/main">
+  <p:cSld>
+    <p:spTree>
+      <p:nvGrpSpPr>
+        <p:cNvPr id="1" name=""/>
+        <p:cNvGrpSpPr/>
+        <p:nvPr/>
+      </p:nvGrpSpPr>
+      <p:grpSpPr>
+        <a:xfrm>
+          <a:off x="0" y="0"/>
+          <a:ext cx="0" cy="0"/>
+          <a:chOff x="0" y="0"/>
+          <a:chExt cx="0" cy="0"/>
+        </a:xfrm>
+      </p:grpSpPr>
+      <p:sp>
+        <p:nvSpPr>
+          <p:cNvPr id="4" name="Title 3"/>
+          <p:cNvSpPr>
+            <a:spLocks noGrp="1"/>
+          </p:cNvSpPr>
+          <p:nvPr>
+            <p:ph type="title"/>
+          </p:nvPr>
+        </p:nvSpPr>
+        <p:spPr/>
+        <p:txBody>
+          <a:bodyPr/>
+          <a:lstStyle/>
+          <a:p>
+            <a:r>
+              <a:rPr lang="en-US" dirty="0" smtClean="0"/>
+              <a:t>Notable new features</a:t>
+            </a:r>
+            <a:endParaRPr lang="en-US" dirty="0"/>
+          </a:p>
+        </p:txBody>
+      </p:sp>
+      <p:sp>
+        <p:nvSpPr>
+          <p:cNvPr id="5" name="Content Placeholder 4"/>
+          <p:cNvSpPr>
+            <a:spLocks noGrp="1"/>
+          </p:cNvSpPr>
+          <p:nvPr>
+            <p:ph sz="quarter" idx="10"/>
+          </p:nvPr>
+        </p:nvSpPr>
+        <p:spPr/>
+        <p:txBody>
+          <a:bodyPr/>
+          <a:lstStyle/>
+          <a:p>
+            <a:r>
+              <a:rPr lang="en-GB" dirty="0" smtClean="0"/>
+              <a:t>Designer has been removed </a:t>
+            </a:r>
+          </a:p>
+          <a:p>
+            <a:pPr lvl="1"/>
+            <a:r>
+              <a:rPr lang="en-GB" dirty="0" smtClean="0"/>
+              <a:t>Code first only</a:t>
+            </a:r>
+          </a:p>
+          <a:p>
+            <a:r>
+              <a:rPr lang="en-GB" dirty="0" smtClean="0"/>
+              <a:t>Rewritten from ground up with performance in mind</a:t>
+            </a:r>
+          </a:p>
+          <a:p>
+            <a:r>
+              <a:rPr lang="en-GB" dirty="0" smtClean="0"/>
+              <a:t>New </a:t>
+            </a:r>
+            <a:r>
+              <a:rPr lang="en-GB" dirty="0"/>
+              <a:t>platforms</a:t>
+            </a:r>
+          </a:p>
+          <a:p>
+            <a:r>
+              <a:rPr lang="en-GB" dirty="0"/>
+              <a:t>New data stores</a:t>
+            </a:r>
+          </a:p>
+          <a:p>
+            <a:r>
+              <a:rPr lang="en-GB" dirty="0"/>
+              <a:t>In memory database</a:t>
+            </a:r>
+            <a:endParaRPr lang="en-US" dirty="0"/>
+          </a:p>
+        </p:txBody>
+      </p:sp>
+    </p:spTree>
+    <p:extLst>
+      <p:ext uri="{BB962C8B-B14F-4D97-AF65-F5344CB8AC3E}">
+        <p14:creationId xmlns:p14="http://schemas.microsoft.com/office/powerpoint/2010/main" val="3686907746"/>
+      </p:ext>
+    </p:extLst>
+  </p:cSld>
+  <p:clrMapOvr>
+    <a:masterClrMapping/>
+  </p:clrMapOvr>
+  <p:timing>
+    <p:tnLst>
+      <p:par>
+        <p:cTn id="1" dur="indefinite" restart="never" nodeType="tmRoot"/>
+      </p:par>
+    </p:tnLst>
+  </p:timing>
+</p:sld>
+</file>
+
+<file path=ppt/slides/slide21.xml><?xml version="1.0" encoding="utf-8"?>
+<p:sld xmlns:a="http://schemas.openxmlformats.org/drawingml/2006/main" xmlns:r="http://schemas.openxmlformats.org/officeDocument/2006/relationships" xmlns:p="http://schemas.openxmlformats.org/presentationml/2006/main">
+  <p:cSld>
+    <p:spTree>
+      <p:nvGrpSpPr>
+        <p:cNvPr id="1" name=""/>
+        <p:cNvGrpSpPr/>
+        <p:nvPr/>
+      </p:nvGrpSpPr>
+      <p:grpSpPr>
+        <a:xfrm>
+          <a:off x="0" y="0"/>
+          <a:ext cx="0" cy="0"/>
+          <a:chOff x="0" y="0"/>
+          <a:chExt cx="0" cy="0"/>
+        </a:xfrm>
+      </p:grpSpPr>
+      <p:sp>
+        <p:nvSpPr>
+          <p:cNvPr id="4" name="Title 3"/>
+          <p:cNvSpPr>
+            <a:spLocks noGrp="1"/>
+          </p:cNvSpPr>
+          <p:nvPr>
+            <p:ph type="title"/>
+          </p:nvPr>
+        </p:nvSpPr>
+        <p:spPr/>
+        <p:txBody>
+          <a:bodyPr/>
+          <a:lstStyle/>
+          <a:p>
+            <a:r>
+              <a:rPr lang="en-US" dirty="0" smtClean="0"/>
+              <a:t>EF 7 Quick Tour</a:t>
+            </a:r>
+            <a:endParaRPr lang="en-US" dirty="0"/>
+          </a:p>
+        </p:txBody>
+      </p:sp>
+    </p:spTree>
+    <p:extLst>
+      <p:ext uri="{BB962C8B-B14F-4D97-AF65-F5344CB8AC3E}">
+        <p14:creationId xmlns:p14="http://schemas.microsoft.com/office/powerpoint/2010/main" val="1599042457"/>
+      </p:ext>
+    </p:extLst>
+  </p:cSld>
+  <p:clrMapOvr>
+    <a:masterClrMapping/>
+  </p:clrMapOvr>
+  <p:timing>
+    <p:tnLst>
+      <p:par>
+        <p:cTn id="1" dur="indefinite" restart="never" nodeType="tmRoot"/>
+      </p:par>
+    </p:tnLst>
+  </p:timing>
+</p:sld>
+</file>
+
+<file path=ppt/slides/slide22.xml><?xml version="1.0" encoding="utf-8"?>
+<p:sld xmlns:a="http://schemas.openxmlformats.org/drawingml/2006/main" xmlns:r="http://schemas.openxmlformats.org/officeDocument/2006/relationships" xmlns:p="http://schemas.openxmlformats.org/presentationml/2006/main">
+  <p:cSld>
+    <p:spTree>
+      <p:nvGrpSpPr>
+        <p:cNvPr id="1" name=""/>
+        <p:cNvGrpSpPr/>
+        <p:nvPr/>
+      </p:nvGrpSpPr>
+      <p:grpSpPr>
+        <a:xfrm>
+          <a:off x="0" y="0"/>
+          <a:ext cx="0" cy="0"/>
+          <a:chOff x="0" y="0"/>
+          <a:chExt cx="0" cy="0"/>
+        </a:xfrm>
+      </p:grpSpPr>
+      <p:sp>
+        <p:nvSpPr>
+          <p:cNvPr id="3" name="Title 2"/>
+          <p:cNvSpPr>
+            <a:spLocks noGrp="1"/>
+          </p:cNvSpPr>
+          <p:nvPr>
+            <p:ph type="title"/>
+          </p:nvPr>
+        </p:nvSpPr>
+        <p:spPr/>
+        <p:txBody>
+          <a:bodyPr/>
+          <a:lstStyle/>
+          <a:p>
+            <a:r>
+              <a:rPr lang="en-US" dirty="0" smtClean="0"/>
+              <a:t>Resources</a:t>
+            </a:r>
+            <a:endParaRPr lang="en-US" dirty="0"/>
+          </a:p>
+        </p:txBody>
+      </p:sp>
+      <p:sp>
+        <p:nvSpPr>
+          <p:cNvPr id="4" name="Content Placeholder 3"/>
+          <p:cNvSpPr>
+            <a:spLocks noGrp="1"/>
+          </p:cNvSpPr>
+          <p:nvPr>
+            <p:ph sz="quarter" idx="10"/>
+          </p:nvPr>
+        </p:nvSpPr>
+        <p:spPr/>
+        <p:txBody>
+          <a:bodyPr/>
+          <a:lstStyle/>
+          <a:p>
+            <a:r>
+              <a:rPr lang="en-US" dirty="0" smtClean="0"/>
+              <a:t>Additional patterns</a:t>
+            </a:r>
+          </a:p>
+          <a:p>
+            <a:pPr lvl="1"/>
+            <a:r>
+              <a:rPr lang="en-US" dirty="0" smtClean="0"/>
+              <a:t>http</a:t>
+            </a:r>
+            <a:r>
+              <a:rPr lang="en-US" dirty="0"/>
+              <a:t>://www.asp.net/mvc/overview/older-versions/getting-started-with-ef-5-using-mvc-4/implementing-the-repository-and-unit-of-work-patterns-in-an-asp-net-mvc-application</a:t>
+            </a:r>
+            <a:endParaRPr lang="en-US" dirty="0"/>
+          </a:p>
+        </p:txBody>
+      </p:sp>
+    </p:spTree>
+    <p:extLst>
+      <p:ext uri="{BB962C8B-B14F-4D97-AF65-F5344CB8AC3E}">
+        <p14:creationId xmlns:p14="http://schemas.microsoft.com/office/powerpoint/2010/main" val="1970048791"/>
+      </p:ext>
+    </p:extLst>
+  </p:cSld>
+  <p:clrMapOvr>
+    <a:masterClrMapping/>
+  </p:clrMapOvr>
+  <p:timing>
+    <p:tnLst>
+      <p:par>
+        <p:cTn id="1" dur="indefinite" restart="never" nodeType="tmRoot"/>
+      </p:par>
+    </p:tnLst>
+  </p:timing>
+</p:sld>
+</file>
+
+<file path=ppt/slides/slide23.xml><?xml version="1.0" encoding="utf-8"?>
+<p:sld xmlns:a="http://schemas.openxmlformats.org/drawingml/2006/main" xmlns:r="http://schemas.openxmlformats.org/officeDocument/2006/relationships" xmlns:p="http://schemas.openxmlformats.org/presentationml/2006/main">
+  <p:cSld>
+    <p:spTree>
+      <p:nvGrpSpPr>
+        <p:cNvPr id="1" name=""/>
+        <p:cNvGrpSpPr/>
+        <p:nvPr/>
+      </p:nvGrpSpPr>
+      <p:grpSpPr>
+        <a:xfrm>
+          <a:off x="0" y="0"/>
+          <a:ext cx="0" cy="0"/>
+          <a:chOff x="0" y="0"/>
+          <a:chExt cx="0" cy="0"/>
+        </a:xfrm>
+      </p:grpSpPr>
+    </p:spTree>
+    <p:extLst>
+      <p:ext uri="{BB962C8B-B14F-4D97-AF65-F5344CB8AC3E}">
+        <p14:creationId xmlns:p14="http://schemas.microsoft.com/office/powerpoint/2010/main" val="898363405"/>
+      </p:ext>
+    </p:extLst>
+  </p:cSld>
+  <p:clrMapOvr>
+    <a:masterClrMapping/>
+  </p:clrMapOvr>
   <p:timing>
     <p:tnLst>
       <p:par>
@@ -4789,53 +8402,24 @@
               <a:rPr lang="en-GB" dirty="0" smtClean="0"/>
               <a:t>Stored procedures</a:t>
             </a:r>
-            <a:endParaRPr lang="en-GB" dirty="0" smtClean="0"/>
+          </a:p>
+          <a:p>
+            <a:r>
+              <a:rPr lang="en-GB" dirty="0"/>
+              <a:t>Increasing user experience with concurrency detection</a:t>
+            </a:r>
           </a:p>
           <a:p>
             <a:r>
               <a:rPr lang="en-GB" dirty="0" smtClean="0"/>
-              <a:t>Concurrency</a:t>
-            </a:r>
-          </a:p>
-          <a:p>
-            <a:r>
-              <a:rPr lang="en-GB" dirty="0" smtClean="0"/>
-              <a:t>Connection resiliency</a:t>
-            </a:r>
-          </a:p>
-          <a:p>
-            <a:r>
-              <a:rPr lang="en-GB" dirty="0" smtClean="0"/>
-              <a:t>EF7</a:t>
-            </a:r>
-            <a:endParaRPr lang="en-GB" dirty="0" smtClean="0"/>
-          </a:p>
-          <a:p>
-            <a:pPr lvl="1"/>
-            <a:r>
-              <a:rPr lang="en-GB" dirty="0" smtClean="0"/>
-              <a:t>New platforms</a:t>
-            </a:r>
-          </a:p>
-          <a:p>
-            <a:pPr lvl="1"/>
-            <a:r>
-              <a:rPr lang="en-GB" dirty="0" smtClean="0"/>
-              <a:t>New data stores</a:t>
-            </a:r>
-          </a:p>
-          <a:p>
-            <a:pPr lvl="1"/>
-            <a:r>
-              <a:rPr lang="en-GB" dirty="0" smtClean="0"/>
-              <a:t>In memory database</a:t>
-            </a:r>
-          </a:p>
-          <a:p>
-            <a:endParaRPr lang="en-GB" dirty="0" smtClean="0"/>
-          </a:p>
-          <a:p>
-            <a:endParaRPr lang="en-GB" dirty="0" smtClean="0"/>
+              <a:t>A few best practices</a:t>
+            </a:r>
+          </a:p>
+          <a:p>
+            <a:r>
+              <a:rPr lang="en-GB" dirty="0"/>
+              <a:t>Looking forward with Entity Framework 7</a:t>
+            </a:r>
           </a:p>
         </p:txBody>
       </p:sp>
@@ -5100,6 +8684,13 @@
   <p:clrMapOvr>
     <a:masterClrMapping/>
   </p:clrMapOvr>
+  <p:timing>
+    <p:tnLst>
+      <p:par>
+        <p:cTn id="1" dur="indefinite" restart="never" nodeType="tmRoot"/>
+      </p:par>
+    </p:tnLst>
+  </p:timing>
 </p:sld>
 </file>
 
@@ -5167,7 +8758,6 @@
               <a:rPr lang="en-US" dirty="0" smtClean="0"/>
               <a:t>Support came as XX	</a:t>
             </a:r>
-            <a:endParaRPr lang="en-US" dirty="0" smtClean="0"/>
           </a:p>
           <a:p>
             <a:r>
@@ -5633,7 +9223,7 @@
     </p:spTree>
     <p:extLst>
       <p:ext uri="{BB962C8B-B14F-4D97-AF65-F5344CB8AC3E}">
-        <p14:creationId xmlns:p14="http://schemas.microsoft.com/office/powerpoint/2010/main" val="3983632752"/>
+        <p14:creationId xmlns:p14="http://schemas.microsoft.com/office/powerpoint/2010/main" val="594630288"/>
       </p:ext>
     </p:extLst>
   </p:cSld>
@@ -5669,12 +9259,12 @@
       </p:grpSpPr>
       <p:sp>
         <p:nvSpPr>
-          <p:cNvPr id="3" name="Title 2"/>
+          <p:cNvPr id="4" name="Text Placeholder 3"/>
           <p:cNvSpPr>
             <a:spLocks noGrp="1"/>
           </p:cNvSpPr>
           <p:nvPr>
-            <p:ph type="title"/>
+            <p:ph type="body" sz="quarter" idx="10"/>
           </p:nvPr>
         </p:nvSpPr>
         <p:spPr/>
@@ -5683,21 +9273,21 @@
           <a:lstStyle/>
           <a:p>
             <a:r>
-              <a:rPr lang="en-US" dirty="0" smtClean="0"/>
-              <a:t>Resources</a:t>
-            </a:r>
-            <a:endParaRPr lang="en-US" dirty="0"/>
-          </a:p>
-        </p:txBody>
-      </p:sp>
-      <p:sp>
-        <p:nvSpPr>
-          <p:cNvPr id="4" name="Content Placeholder 3"/>
+              <a:rPr lang="en-GB" dirty="0" smtClean="0"/>
+              <a:t>Increasing user experience with concurrency detection</a:t>
+            </a:r>
+            <a:endParaRPr lang="en-GB" dirty="0"/>
+          </a:p>
+        </p:txBody>
+      </p:sp>
+      <p:sp>
+        <p:nvSpPr>
+          <p:cNvPr id="3" name="Subtitle 2"/>
           <p:cNvSpPr>
             <a:spLocks noGrp="1"/>
           </p:cNvSpPr>
           <p:nvPr>
-            <p:ph sz="quarter" idx="10"/>
+            <p:ph type="subTitle" idx="1"/>
           </p:nvPr>
         </p:nvSpPr>
         <p:spPr/>
@@ -5705,10 +9295,6 @@
           <a:bodyPr/>
           <a:lstStyle/>
           <a:p>
-            <a:r>
-              <a:rPr lang="en-US" dirty="0" smtClean="0"/>
-              <a:t>TBC</a:t>
-            </a:r>
             <a:endParaRPr lang="en-US" dirty="0"/>
           </a:p>
         </p:txBody>
@@ -5716,7 +9302,7 @@
     </p:spTree>
     <p:extLst>
       <p:ext uri="{BB962C8B-B14F-4D97-AF65-F5344CB8AC3E}">
-        <p14:creationId xmlns:p14="http://schemas.microsoft.com/office/powerpoint/2010/main" val="1970048791"/>
+        <p14:creationId xmlns:p14="http://schemas.microsoft.com/office/powerpoint/2010/main" val="3726975841"/>
       </p:ext>
     </p:extLst>
   </p:cSld>
@@ -6541,28 +10127,6 @@
 </file>
 
 <file path=customXml/item1.xml><?xml version="1.0" encoding="utf-8"?>
-<p:properties xmlns:p="http://schemas.microsoft.com/office/2006/metadata/properties" xmlns:xsi="http://www.w3.org/2001/XMLSchema-instance" xmlns:pc="http://schemas.microsoft.com/office/infopath/2007/PartnerControls">
-  <documentManagement>
-    <TaxCatchAll xmlns="230e9df3-be65-4c73-a93b-d1236ebd677e"/>
-    <PublishingExpirationDate xmlns="http://schemas.microsoft.com/sharepoint/v3" xsi:nil="true"/>
-    <PublishingStartDate xmlns="http://schemas.microsoft.com/sharepoint/v3" xsi:nil="true"/>
-    <TaxKeywordTaxHTField xmlns="230e9df3-be65-4c73-a93b-d1236ebd677e">
-      <Terms xmlns="http://schemas.microsoft.com/office/infopath/2007/PartnerControls"/>
-    </TaxKeywordTaxHTField>
-  </documentManagement>
-</p:properties>
-</file>
-
-<file path=customXml/item2.xml><?xml version="1.0" encoding="utf-8"?>
-<?mso-contentType ?>
-<FormTemplates xmlns="http://schemas.microsoft.com/sharepoint/v3/contenttype/forms">
-  <Display>DocumentLibraryForm</Display>
-  <Edit>DocumentLibraryForm</Edit>
-  <New>DocumentLibraryForm</New>
-</FormTemplates>
-</file>
-
-<file path=customXml/item3.xml><?xml version="1.0" encoding="utf-8"?>
 <ct:contentTypeSchema xmlns:ct="http://schemas.microsoft.com/office/2006/metadata/contentType" xmlns:ma="http://schemas.microsoft.com/office/2006/metadata/properties/metaAttributes" ct:_="" ma:_="" ma:contentTypeName="Document" ma:contentTypeID="0x010100496889825850D44592AC5D2F43187AE4" ma:contentTypeVersion="5" ma:contentTypeDescription="Create a new document." ma:contentTypeScope="" ma:versionID="fde90edb5a63ba841bca516fd2abaf95">
   <xsd:schema xmlns:xsd="http://www.w3.org/2001/XMLSchema" xmlns:xs="http://www.w3.org/2001/XMLSchema" xmlns:p="http://schemas.microsoft.com/office/2006/metadata/properties" xmlns:ns1="http://schemas.microsoft.com/sharepoint/v3" xmlns:ns2="230e9df3-be65-4c73-a93b-d1236ebd677e" xmlns:ns3="27aa9422-7f1f-4c84-9cdf-302b1a67e513" targetNamespace="http://schemas.microsoft.com/office/2006/metadata/properties" ma:root="true" ma:fieldsID="5e7808ae941cc340dbe51a3031959734" ns1:_="" ns2:_="" ns3:_="">
     <xsd:import namespace="http://schemas.microsoft.com/sharepoint/v3"/>
@@ -6744,33 +10308,29 @@
 </ct:contentTypeSchema>
 </file>
 
-<file path=customXml/itemProps1.xml><?xml version="1.0" encoding="utf-8"?>
-<ds:datastoreItem xmlns:ds="http://schemas.openxmlformats.org/officeDocument/2006/customXml" ds:itemID="{7025FDD9-4C58-4084-9F89-0E6ADD6FFF55}">
-  <ds:schemaRefs>
-    <ds:schemaRef ds:uri="http://purl.org/dc/terms/"/>
-    <ds:schemaRef ds:uri="http://schemas.microsoft.com/sharepoint/v3"/>
-    <ds:schemaRef ds:uri="http://www.w3.org/XML/1998/namespace"/>
-    <ds:schemaRef ds:uri="http://purl.org/dc/elements/1.1/"/>
-    <ds:schemaRef ds:uri="230e9df3-be65-4c73-a93b-d1236ebd677e"/>
-    <ds:schemaRef ds:uri="27aa9422-7f1f-4c84-9cdf-302b1a67e513"/>
-    <ds:schemaRef ds:uri="http://schemas.microsoft.com/office/infopath/2007/PartnerControls"/>
-    <ds:schemaRef ds:uri="http://schemas.microsoft.com/office/2006/documentManagement/types"/>
-    <ds:schemaRef ds:uri="http://schemas.openxmlformats.org/package/2006/metadata/core-properties"/>
-    <ds:schemaRef ds:uri="http://schemas.microsoft.com/office/2006/metadata/properties"/>
-    <ds:schemaRef ds:uri="http://purl.org/dc/dcmitype/"/>
-  </ds:schemaRefs>
-</ds:datastoreItem>
+<file path=customXml/item2.xml><?xml version="1.0" encoding="utf-8"?>
+<?mso-contentType ?>
+<FormTemplates xmlns="http://schemas.microsoft.com/sharepoint/v3/contenttype/forms">
+  <Display>DocumentLibraryForm</Display>
+  <Edit>DocumentLibraryForm</Edit>
+  <New>DocumentLibraryForm</New>
+</FormTemplates>
 </file>
 
-<file path=customXml/itemProps2.xml><?xml version="1.0" encoding="utf-8"?>
-<ds:datastoreItem xmlns:ds="http://schemas.openxmlformats.org/officeDocument/2006/customXml" ds:itemID="{B0CA13EC-1D3C-4D6F-8D1C-E8A452CFC79A}">
-  <ds:schemaRefs>
-    <ds:schemaRef ds:uri="http://schemas.microsoft.com/sharepoint/v3/contenttype/forms"/>
-  </ds:schemaRefs>
-</ds:datastoreItem>
+<file path=customXml/item3.xml><?xml version="1.0" encoding="utf-8"?>
+<p:properties xmlns:p="http://schemas.microsoft.com/office/2006/metadata/properties" xmlns:xsi="http://www.w3.org/2001/XMLSchema-instance" xmlns:pc="http://schemas.microsoft.com/office/infopath/2007/PartnerControls">
+  <documentManagement>
+    <TaxCatchAll xmlns="230e9df3-be65-4c73-a93b-d1236ebd677e"/>
+    <PublishingExpirationDate xmlns="http://schemas.microsoft.com/sharepoint/v3" xsi:nil="true"/>
+    <PublishingStartDate xmlns="http://schemas.microsoft.com/sharepoint/v3" xsi:nil="true"/>
+    <TaxKeywordTaxHTField xmlns="230e9df3-be65-4c73-a93b-d1236ebd677e">
+      <Terms xmlns="http://schemas.microsoft.com/office/infopath/2007/PartnerControls"/>
+    </TaxKeywordTaxHTField>
+  </documentManagement>
+</p:properties>
 </file>
 
-<file path=customXml/itemProps3.xml><?xml version="1.0" encoding="utf-8"?>
+<file path=customXml/itemProps1.xml><?xml version="1.0" encoding="utf-8"?>
 <ds:datastoreItem xmlns:ds="http://schemas.openxmlformats.org/officeDocument/2006/customXml" ds:itemID="{3253B29C-1CCD-4FE8-A1C4-023A0910DF96}">
   <ds:schemaRefs>
     <ds:schemaRef ds:uri="http://schemas.microsoft.com/office/2006/metadata/contentType"/>
@@ -6788,4 +10348,30 @@
     <ds:schemaRef ds:uri="http://schemas.microsoft.com/internal/obd"/>
   </ds:schemaRefs>
 </ds:datastoreItem>
+</file>
+
+<file path=customXml/itemProps2.xml><?xml version="1.0" encoding="utf-8"?>
+<ds:datastoreItem xmlns:ds="http://schemas.openxmlformats.org/officeDocument/2006/customXml" ds:itemID="{B0CA13EC-1D3C-4D6F-8D1C-E8A452CFC79A}">
+  <ds:schemaRefs>
+    <ds:schemaRef ds:uri="http://schemas.microsoft.com/sharepoint/v3/contenttype/forms"/>
+  </ds:schemaRefs>
+</ds:datastoreItem>
+</file>
+
+<file path=customXml/itemProps3.xml><?xml version="1.0" encoding="utf-8"?>
+<ds:datastoreItem xmlns:ds="http://schemas.openxmlformats.org/officeDocument/2006/customXml" ds:itemID="{7025FDD9-4C58-4084-9F89-0E6ADD6FFF55}">
+  <ds:schemaRefs>
+    <ds:schemaRef ds:uri="http://purl.org/dc/terms/"/>
+    <ds:schemaRef ds:uri="http://schemas.microsoft.com/sharepoint/v3"/>
+    <ds:schemaRef ds:uri="http://www.w3.org/XML/1998/namespace"/>
+    <ds:schemaRef ds:uri="http://purl.org/dc/elements/1.1/"/>
+    <ds:schemaRef ds:uri="230e9df3-be65-4c73-a93b-d1236ebd677e"/>
+    <ds:schemaRef ds:uri="27aa9422-7f1f-4c84-9cdf-302b1a67e513"/>
+    <ds:schemaRef ds:uri="http://schemas.microsoft.com/office/infopath/2007/PartnerControls"/>
+    <ds:schemaRef ds:uri="http://schemas.microsoft.com/office/2006/documentManagement/types"/>
+    <ds:schemaRef ds:uri="http://schemas.openxmlformats.org/package/2006/metadata/core-properties"/>
+    <ds:schemaRef ds:uri="http://schemas.microsoft.com/office/2006/metadata/properties"/>
+    <ds:schemaRef ds:uri="http://purl.org/dc/dcmitype/"/>
+  </ds:schemaRefs>
+</ds:datastoreItem>
 </file>
</xml_diff>